<commit_message>
feat: update slides to sync with new test infra
</commit_message>
<xml_diff>
--- a/DocTestGuide_CHS.pptx
+++ b/DocTestGuide_CHS.pptx
@@ -5,25 +5,24 @@
     <p:sldMasterId id="2147483648" r:id="rId1"/>
   </p:sldMasterIdLst>
   <p:notesMasterIdLst>
-    <p:notesMasterId r:id="rId18"/>
+    <p:notesMasterId r:id="rId17"/>
   </p:notesMasterIdLst>
   <p:sldIdLst>
     <p:sldId id="1739" r:id="rId2"/>
-    <p:sldId id="2493" r:id="rId3"/>
-    <p:sldId id="2491" r:id="rId4"/>
-    <p:sldId id="2492" r:id="rId5"/>
+    <p:sldId id="2506" r:id="rId3"/>
+    <p:sldId id="2493" r:id="rId4"/>
+    <p:sldId id="2491" r:id="rId5"/>
     <p:sldId id="2494" r:id="rId6"/>
     <p:sldId id="2500" r:id="rId7"/>
     <p:sldId id="2499" r:id="rId8"/>
     <p:sldId id="2495" r:id="rId9"/>
-    <p:sldId id="2496" r:id="rId10"/>
-    <p:sldId id="2497" r:id="rId11"/>
-    <p:sldId id="2498" r:id="rId12"/>
-    <p:sldId id="2502" r:id="rId13"/>
-    <p:sldId id="2505" r:id="rId14"/>
-    <p:sldId id="2501" r:id="rId15"/>
-    <p:sldId id="2503" r:id="rId16"/>
-    <p:sldId id="2504" r:id="rId17"/>
+    <p:sldId id="2497" r:id="rId10"/>
+    <p:sldId id="2502" r:id="rId11"/>
+    <p:sldId id="2505" r:id="rId12"/>
+    <p:sldId id="2501" r:id="rId13"/>
+    <p:sldId id="2503" r:id="rId14"/>
+    <p:sldId id="2504" r:id="rId15"/>
+    <p:sldId id="2492" r:id="rId16"/>
   </p:sldIdLst>
   <p:sldSz cx="12192000" cy="6858000"/>
   <p:notesSz cx="6858000" cy="9144000"/>
@@ -223,7 +222,7 @@
           <a:p>
             <a:fld id="{53373C09-6643-430A-BFE6-C171E7EA971C}" type="datetimeFigureOut">
               <a:rPr lang="zh-CN" altLang="en-US" smtClean="0"/>
-              <a:t>2023/4/19</a:t>
+              <a:t>2023/12/11</a:t>
             </a:fld>
             <a:endParaRPr lang="zh-CN" altLang="en-US"/>
           </a:p>
@@ -722,7 +721,7 @@
           <a:p>
             <a:fld id="{7FD8E35C-940E-4CD9-87DA-E2B3BFC1D073}" type="datetimeFigureOut">
               <a:rPr lang="zh-CN" altLang="en-US" smtClean="0"/>
-              <a:t>2023/4/19</a:t>
+              <a:t>2023/12/11</a:t>
             </a:fld>
             <a:endParaRPr lang="zh-CN" altLang="en-US"/>
           </a:p>
@@ -922,7 +921,7 @@
           <a:p>
             <a:fld id="{7FD8E35C-940E-4CD9-87DA-E2B3BFC1D073}" type="datetimeFigureOut">
               <a:rPr lang="zh-CN" altLang="en-US" smtClean="0"/>
-              <a:t>2023/4/19</a:t>
+              <a:t>2023/12/11</a:t>
             </a:fld>
             <a:endParaRPr lang="zh-CN" altLang="en-US"/>
           </a:p>
@@ -1132,7 +1131,7 @@
           <a:p>
             <a:fld id="{7FD8E35C-940E-4CD9-87DA-E2B3BFC1D073}" type="datetimeFigureOut">
               <a:rPr lang="zh-CN" altLang="en-US" smtClean="0"/>
-              <a:t>2023/4/19</a:t>
+              <a:t>2023/12/11</a:t>
             </a:fld>
             <a:endParaRPr lang="zh-CN" altLang="en-US"/>
           </a:p>
@@ -1995,7 +1994,7 @@
           <a:p>
             <a:fld id="{7FD8E35C-940E-4CD9-87DA-E2B3BFC1D073}" type="datetimeFigureOut">
               <a:rPr lang="zh-CN" altLang="en-US" smtClean="0"/>
-              <a:t>2023/4/19</a:t>
+              <a:t>2023/12/11</a:t>
             </a:fld>
             <a:endParaRPr lang="zh-CN" altLang="en-US"/>
           </a:p>
@@ -2271,7 +2270,7 @@
           <a:p>
             <a:fld id="{7FD8E35C-940E-4CD9-87DA-E2B3BFC1D073}" type="datetimeFigureOut">
               <a:rPr lang="zh-CN" altLang="en-US" smtClean="0"/>
-              <a:t>2023/4/19</a:t>
+              <a:t>2023/12/11</a:t>
             </a:fld>
             <a:endParaRPr lang="zh-CN" altLang="en-US"/>
           </a:p>
@@ -2539,7 +2538,7 @@
           <a:p>
             <a:fld id="{7FD8E35C-940E-4CD9-87DA-E2B3BFC1D073}" type="datetimeFigureOut">
               <a:rPr lang="zh-CN" altLang="en-US" smtClean="0"/>
-              <a:t>2023/4/19</a:t>
+              <a:t>2023/12/11</a:t>
             </a:fld>
             <a:endParaRPr lang="zh-CN" altLang="en-US"/>
           </a:p>
@@ -2954,7 +2953,7 @@
           <a:p>
             <a:fld id="{7FD8E35C-940E-4CD9-87DA-E2B3BFC1D073}" type="datetimeFigureOut">
               <a:rPr lang="zh-CN" altLang="en-US" smtClean="0"/>
-              <a:t>2023/4/19</a:t>
+              <a:t>2023/12/11</a:t>
             </a:fld>
             <a:endParaRPr lang="zh-CN" altLang="en-US"/>
           </a:p>
@@ -3096,7 +3095,7 @@
           <a:p>
             <a:fld id="{7FD8E35C-940E-4CD9-87DA-E2B3BFC1D073}" type="datetimeFigureOut">
               <a:rPr lang="zh-CN" altLang="en-US" smtClean="0"/>
-              <a:t>2023/4/19</a:t>
+              <a:t>2023/12/11</a:t>
             </a:fld>
             <a:endParaRPr lang="zh-CN" altLang="en-US"/>
           </a:p>
@@ -3209,7 +3208,7 @@
           <a:p>
             <a:fld id="{7FD8E35C-940E-4CD9-87DA-E2B3BFC1D073}" type="datetimeFigureOut">
               <a:rPr lang="zh-CN" altLang="en-US" smtClean="0"/>
-              <a:t>2023/4/19</a:t>
+              <a:t>2023/12/11</a:t>
             </a:fld>
             <a:endParaRPr lang="zh-CN" altLang="en-US"/>
           </a:p>
@@ -3522,7 +3521,7 @@
           <a:p>
             <a:fld id="{7FD8E35C-940E-4CD9-87DA-E2B3BFC1D073}" type="datetimeFigureOut">
               <a:rPr lang="zh-CN" altLang="en-US" smtClean="0"/>
-              <a:t>2023/4/19</a:t>
+              <a:t>2023/12/11</a:t>
             </a:fld>
             <a:endParaRPr lang="zh-CN" altLang="en-US"/>
           </a:p>
@@ -3815,7 +3814,7 @@
           <a:p>
             <a:fld id="{7FD8E35C-940E-4CD9-87DA-E2B3BFC1D073}" type="datetimeFigureOut">
               <a:rPr lang="zh-CN" altLang="en-US" smtClean="0"/>
-              <a:t>2023/4/19</a:t>
+              <a:t>2023/12/11</a:t>
             </a:fld>
             <a:endParaRPr lang="zh-CN" altLang="en-US"/>
           </a:p>
@@ -4056,7 +4055,7 @@
           <a:p>
             <a:fld id="{7FD8E35C-940E-4CD9-87DA-E2B3BFC1D073}" type="datetimeFigureOut">
               <a:rPr lang="zh-CN" altLang="en-US" smtClean="0"/>
-              <a:t>2023/4/19</a:t>
+              <a:t>2023/12/11</a:t>
             </a:fld>
             <a:endParaRPr lang="zh-CN" altLang="en-US"/>
           </a:p>
@@ -4635,7 +4634,25 @@
                 <a:cs typeface="+mn-ea"/>
                 <a:sym typeface="+mn-lt"/>
               </a:rPr>
-              <a:t>如何接入文档测试框架？</a:t>
+              <a:t>如何接入 </a:t>
+            </a:r>
+            <a:r>
+              <a:rPr lang="en-US" altLang="zh-CN" sz="4000" dirty="0">
+                <a:latin typeface="+mn-lt"/>
+                <a:ea typeface="+mn-ea"/>
+                <a:cs typeface="+mn-ea"/>
+                <a:sym typeface="+mn-lt"/>
+              </a:rPr>
+              <a:t>ENRE </a:t>
+            </a:r>
+            <a:r>
+              <a:rPr lang="zh-CN" altLang="en-US" sz="4000" dirty="0">
+                <a:latin typeface="+mn-lt"/>
+                <a:ea typeface="+mn-ea"/>
+                <a:cs typeface="+mn-ea"/>
+                <a:sym typeface="+mn-lt"/>
+              </a:rPr>
+              <a:t>测试框架？</a:t>
             </a:r>
             <a:endParaRPr lang="en-US" altLang="zh-CN" sz="4000" dirty="0">
               <a:latin typeface="+mn-lt"/>
@@ -4739,7 +4756,7 @@
         <p:spPr>
           <a:xfrm>
             <a:off x="-6084" y="4437112"/>
-            <a:ext cx="12198084" cy="427040"/>
+            <a:ext cx="12198084" cy="799706"/>
           </a:xfrm>
           <a:prstGeom prst="rect">
             <a:avLst/>
@@ -4765,7 +4782,24 @@
                 <a:cs typeface="+mn-ea"/>
                 <a:sym typeface="+mn-lt"/>
               </a:rPr>
-              <a:t>2023-4-19</a:t>
+              <a:t>V2.0</a:t>
+            </a:r>
+          </a:p>
+          <a:p>
+            <a:pPr algn="ctr" eaLnBrk="1" hangingPunct="1">
+              <a:lnSpc>
+                <a:spcPct val="120000"/>
+              </a:lnSpc>
+            </a:pPr>
+            <a:r>
+              <a:rPr lang="en-US" altLang="zh-CN" sz="2000" kern="0" dirty="0">
+                <a:solidFill>
+                  <a:srgbClr val="31589C"/>
+                </a:solidFill>
+                <a:cs typeface="+mn-ea"/>
+                <a:sym typeface="+mn-lt"/>
+              </a:rPr>
+              <a:t>2023-12-11</a:t>
             </a:r>
             <a:endParaRPr lang="zh-CN" altLang="en-US" sz="2000" dirty="0">
               <a:solidFill>
@@ -4786,630 +4820,6 @@
 </file>
 
 <file path=ppt/slides/slide10.xml><?xml version="1.0" encoding="utf-8"?>
-<p:sld xmlns:a="http://schemas.openxmlformats.org/drawingml/2006/main" xmlns:r="http://schemas.openxmlformats.org/officeDocument/2006/relationships" xmlns:p="http://schemas.openxmlformats.org/presentationml/2006/main">
-  <p:cSld>
-    <p:spTree>
-      <p:nvGrpSpPr>
-        <p:cNvPr id="1" name=""/>
-        <p:cNvGrpSpPr/>
-        <p:nvPr/>
-      </p:nvGrpSpPr>
-      <p:grpSpPr>
-        <a:xfrm>
-          <a:off x="0" y="0"/>
-          <a:ext cx="0" cy="0"/>
-          <a:chOff x="0" y="0"/>
-          <a:chExt cx="0" cy="0"/>
-        </a:xfrm>
-      </p:grpSpPr>
-      <p:sp>
-        <p:nvSpPr>
-          <p:cNvPr id="2" name="Text Placeholder 1">
-            <a:extLst>
-              <a:ext uri="{FF2B5EF4-FFF2-40B4-BE49-F238E27FC236}">
-                <a16:creationId xmlns:a16="http://schemas.microsoft.com/office/drawing/2014/main" id="{A4F8FA1D-B622-51FA-A8C3-4D69DD64834A}"/>
-              </a:ext>
-            </a:extLst>
-          </p:cNvPr>
-          <p:cNvSpPr>
-            <a:spLocks noGrp="1"/>
-          </p:cNvSpPr>
-          <p:nvPr>
-            <p:ph type="body" sz="quarter" idx="11"/>
-          </p:nvPr>
-        </p:nvSpPr>
-        <p:spPr/>
-        <p:txBody>
-          <a:bodyPr/>
-          <a:lstStyle/>
-          <a:p>
-            <a:r>
-              <a:rPr lang="zh-CN" altLang="en-US" dirty="0"/>
-              <a:t>接入 </a:t>
-            </a:r>
-            <a:r>
-              <a:rPr lang="en-US" altLang="zh-CN" dirty="0"/>
-              <a:t>/ 4 </a:t>
-            </a:r>
-            <a:r>
-              <a:rPr lang="zh-CN" altLang="en-US" dirty="0"/>
-              <a:t>编写自己的</a:t>
-            </a:r>
-            <a:r>
-              <a:rPr lang="en-US" altLang="zh-CN" dirty="0"/>
-              <a:t>test-generator</a:t>
-            </a:r>
-            <a:endParaRPr lang="zh-CN" altLang="en-US" dirty="0"/>
-          </a:p>
-        </p:txBody>
-      </p:sp>
-      <p:sp>
-        <p:nvSpPr>
-          <p:cNvPr id="3" name="Content Placeholder 2">
-            <a:extLst>
-              <a:ext uri="{FF2B5EF4-FFF2-40B4-BE49-F238E27FC236}">
-                <a16:creationId xmlns:a16="http://schemas.microsoft.com/office/drawing/2014/main" id="{5C9D8ECD-9527-B2DD-822F-D07CE3A58028}"/>
-              </a:ext>
-            </a:extLst>
-          </p:cNvPr>
-          <p:cNvSpPr>
-            <a:spLocks noGrp="1"/>
-          </p:cNvSpPr>
-          <p:nvPr>
-            <p:ph sz="quarter" idx="12"/>
-          </p:nvPr>
-        </p:nvSpPr>
-        <p:spPr/>
-        <p:txBody>
-          <a:bodyPr/>
-          <a:lstStyle/>
-          <a:p>
-            <a:r>
-              <a:rPr lang="en-US" altLang="zh-CN" dirty="0"/>
-              <a:t>packages/enre-test-generator/src/</a:t>
-            </a:r>
-            <a:r>
-              <a:rPr lang="en-US" altLang="zh-CN" dirty="0" err="1"/>
-              <a:t>index.ts</a:t>
-            </a:r>
-            <a:endParaRPr lang="en-US" altLang="zh-CN" dirty="0"/>
-          </a:p>
-          <a:p>
-            <a:r>
-              <a:rPr lang="zh-CN" altLang="en-US" dirty="0"/>
-              <a:t>仿照该文件，使用</a:t>
-            </a:r>
-            <a:r>
-              <a:rPr lang="en-US" altLang="zh-CN" dirty="0"/>
-              <a:t>doc-parser</a:t>
-            </a:r>
-            <a:r>
-              <a:rPr lang="zh-CN" altLang="en-US" dirty="0"/>
-              <a:t>所提供的</a:t>
-            </a:r>
-            <a:r>
-              <a:rPr lang="en-US" altLang="zh-CN" dirty="0"/>
-              <a:t>parser</a:t>
-            </a:r>
-            <a:r>
-              <a:rPr lang="zh-CN" altLang="en-US" dirty="0"/>
-              <a:t>接口将输入进来的文档数据结构转换为自己语言下特定测试框架所用的代码（字符串拼接）</a:t>
-            </a:r>
-            <a:endParaRPr lang="en-US" altLang="zh-CN" dirty="0"/>
-          </a:p>
-          <a:p>
-            <a:pPr marL="0" indent="0">
-              <a:buNone/>
-            </a:pPr>
-            <a:endParaRPr lang="zh-CN" altLang="en-US" dirty="0"/>
-          </a:p>
-        </p:txBody>
-      </p:sp>
-      <p:pic>
-        <p:nvPicPr>
-          <p:cNvPr id="4" name="Picture 3" descr="Graphical user interface, text, application, Teams&#10;&#10;Description automatically generated">
-            <a:extLst>
-              <a:ext uri="{FF2B5EF4-FFF2-40B4-BE49-F238E27FC236}">
-                <a16:creationId xmlns:a16="http://schemas.microsoft.com/office/drawing/2014/main" id="{FB0824A5-D12F-ED79-5990-6529184788CD}"/>
-              </a:ext>
-            </a:extLst>
-          </p:cNvPr>
-          <p:cNvPicPr>
-            <a:picLocks noChangeAspect="1"/>
-          </p:cNvPicPr>
-          <p:nvPr/>
-        </p:nvPicPr>
-        <p:blipFill rotWithShape="1">
-          <a:blip r:embed="rId2">
-            <a:extLst>
-              <a:ext uri="{28A0092B-C50C-407E-A947-70E740481C1C}">
-                <a14:useLocalDpi xmlns:a14="http://schemas.microsoft.com/office/drawing/2010/main" val="0"/>
-              </a:ext>
-            </a:extLst>
-          </a:blip>
-          <a:srcRect l="10235" t="58213" r="65406" b="30839"/>
-          <a:stretch/>
-        </p:blipFill>
-        <p:spPr>
-          <a:xfrm>
-            <a:off x="470358" y="3429000"/>
-            <a:ext cx="3590654" cy="2779859"/>
-          </a:xfrm>
-          <a:prstGeom prst="rect">
-            <a:avLst/>
-          </a:prstGeom>
-        </p:spPr>
-      </p:pic>
-      <p:pic>
-        <p:nvPicPr>
-          <p:cNvPr id="5" name="Picture 4" descr="Text&#10;&#10;Description automatically generated">
-            <a:extLst>
-              <a:ext uri="{FF2B5EF4-FFF2-40B4-BE49-F238E27FC236}">
-                <a16:creationId xmlns:a16="http://schemas.microsoft.com/office/drawing/2014/main" id="{0F7451F1-CDCD-6F51-192F-88C78C25DB34}"/>
-              </a:ext>
-            </a:extLst>
-          </p:cNvPr>
-          <p:cNvPicPr>
-            <a:picLocks noChangeAspect="1"/>
-          </p:cNvPicPr>
-          <p:nvPr/>
-        </p:nvPicPr>
-        <p:blipFill rotWithShape="1">
-          <a:blip r:embed="rId3">
-            <a:extLst>
-              <a:ext uri="{28A0092B-C50C-407E-A947-70E740481C1C}">
-                <a14:useLocalDpi xmlns:a14="http://schemas.microsoft.com/office/drawing/2010/main" val="0"/>
-              </a:ext>
-            </a:extLst>
-          </a:blip>
-          <a:srcRect l="5414" t="18979" r="32016" b="46505"/>
-          <a:stretch/>
-        </p:blipFill>
-        <p:spPr>
-          <a:xfrm>
-            <a:off x="7420666" y="2770970"/>
-            <a:ext cx="4300976" cy="4087030"/>
-          </a:xfrm>
-          <a:prstGeom prst="rect">
-            <a:avLst/>
-          </a:prstGeom>
-        </p:spPr>
-      </p:pic>
-      <p:cxnSp>
-        <p:nvCxnSpPr>
-          <p:cNvPr id="7" name="Straight Arrow Connector 6">
-            <a:extLst>
-              <a:ext uri="{FF2B5EF4-FFF2-40B4-BE49-F238E27FC236}">
-                <a16:creationId xmlns:a16="http://schemas.microsoft.com/office/drawing/2014/main" id="{53924D53-20B7-1113-9662-DEC538A7372E}"/>
-              </a:ext>
-            </a:extLst>
-          </p:cNvPr>
-          <p:cNvCxnSpPr/>
-          <p:nvPr/>
-        </p:nvCxnSpPr>
-        <p:spPr>
-          <a:xfrm>
-            <a:off x="2474259" y="4383741"/>
-            <a:ext cx="5701553" cy="1645583"/>
-          </a:xfrm>
-          <a:prstGeom prst="straightConnector1">
-            <a:avLst/>
-          </a:prstGeom>
-          <a:ln>
-            <a:tailEnd type="triangle"/>
-          </a:ln>
-        </p:spPr>
-        <p:style>
-          <a:lnRef idx="1">
-            <a:schemeClr val="accent1"/>
-          </a:lnRef>
-          <a:fillRef idx="0">
-            <a:schemeClr val="accent1"/>
-          </a:fillRef>
-          <a:effectRef idx="0">
-            <a:schemeClr val="accent1"/>
-          </a:effectRef>
-          <a:fontRef idx="minor">
-            <a:schemeClr val="tx1"/>
-          </a:fontRef>
-        </p:style>
-      </p:cxnSp>
-      <p:cxnSp>
-        <p:nvCxnSpPr>
-          <p:cNvPr id="9" name="Straight Arrow Connector 8">
-            <a:extLst>
-              <a:ext uri="{FF2B5EF4-FFF2-40B4-BE49-F238E27FC236}">
-                <a16:creationId xmlns:a16="http://schemas.microsoft.com/office/drawing/2014/main" id="{FFF72676-640D-9D7D-144F-0C162FB0D685}"/>
-              </a:ext>
-            </a:extLst>
-          </p:cNvPr>
-          <p:cNvCxnSpPr/>
-          <p:nvPr/>
-        </p:nvCxnSpPr>
-        <p:spPr>
-          <a:xfrm flipV="1">
-            <a:off x="2474259" y="3953435"/>
-            <a:ext cx="5513294" cy="735106"/>
-          </a:xfrm>
-          <a:prstGeom prst="straightConnector1">
-            <a:avLst/>
-          </a:prstGeom>
-          <a:ln>
-            <a:tailEnd type="triangle"/>
-          </a:ln>
-        </p:spPr>
-        <p:style>
-          <a:lnRef idx="1">
-            <a:schemeClr val="accent1"/>
-          </a:lnRef>
-          <a:fillRef idx="0">
-            <a:schemeClr val="accent1"/>
-          </a:fillRef>
-          <a:effectRef idx="0">
-            <a:schemeClr val="accent1"/>
-          </a:effectRef>
-          <a:fontRef idx="minor">
-            <a:schemeClr val="tx1"/>
-          </a:fontRef>
-        </p:style>
-      </p:cxnSp>
-      <p:cxnSp>
-        <p:nvCxnSpPr>
-          <p:cNvPr id="11" name="Straight Arrow Connector 10">
-            <a:extLst>
-              <a:ext uri="{FF2B5EF4-FFF2-40B4-BE49-F238E27FC236}">
-                <a16:creationId xmlns:a16="http://schemas.microsoft.com/office/drawing/2014/main" id="{5DD0BAF5-1D8B-4B21-D9FA-E6EF5B9DF856}"/>
-              </a:ext>
-            </a:extLst>
-          </p:cNvPr>
-          <p:cNvCxnSpPr/>
-          <p:nvPr/>
-        </p:nvCxnSpPr>
-        <p:spPr>
-          <a:xfrm flipV="1">
-            <a:off x="3863788" y="4285129"/>
-            <a:ext cx="4267202" cy="921403"/>
-          </a:xfrm>
-          <a:prstGeom prst="straightConnector1">
-            <a:avLst/>
-          </a:prstGeom>
-          <a:ln>
-            <a:tailEnd type="triangle"/>
-          </a:ln>
-        </p:spPr>
-        <p:style>
-          <a:lnRef idx="1">
-            <a:schemeClr val="accent1"/>
-          </a:lnRef>
-          <a:fillRef idx="0">
-            <a:schemeClr val="accent1"/>
-          </a:fillRef>
-          <a:effectRef idx="0">
-            <a:schemeClr val="accent1"/>
-          </a:effectRef>
-          <a:fontRef idx="minor">
-            <a:schemeClr val="tx1"/>
-          </a:fontRef>
-        </p:style>
-      </p:cxnSp>
-      <p:cxnSp>
-        <p:nvCxnSpPr>
-          <p:cNvPr id="13" name="Straight Arrow Connector 12">
-            <a:extLst>
-              <a:ext uri="{FF2B5EF4-FFF2-40B4-BE49-F238E27FC236}">
-                <a16:creationId xmlns:a16="http://schemas.microsoft.com/office/drawing/2014/main" id="{7ED60F11-1B36-FAEF-3087-2F579F53B2A3}"/>
-              </a:ext>
-            </a:extLst>
-          </p:cNvPr>
-          <p:cNvCxnSpPr/>
-          <p:nvPr/>
-        </p:nvCxnSpPr>
-        <p:spPr>
-          <a:xfrm flipV="1">
-            <a:off x="3607238" y="5002306"/>
-            <a:ext cx="4496856" cy="546847"/>
-          </a:xfrm>
-          <a:prstGeom prst="straightConnector1">
-            <a:avLst/>
-          </a:prstGeom>
-          <a:ln>
-            <a:tailEnd type="triangle"/>
-          </a:ln>
-        </p:spPr>
-        <p:style>
-          <a:lnRef idx="1">
-            <a:schemeClr val="accent1"/>
-          </a:lnRef>
-          <a:fillRef idx="0">
-            <a:schemeClr val="accent1"/>
-          </a:fillRef>
-          <a:effectRef idx="0">
-            <a:schemeClr val="accent1"/>
-          </a:effectRef>
-          <a:fontRef idx="minor">
-            <a:schemeClr val="tx1"/>
-          </a:fontRef>
-        </p:style>
-      </p:cxnSp>
-      <p:cxnSp>
-        <p:nvCxnSpPr>
-          <p:cNvPr id="15" name="Straight Arrow Connector 14">
-            <a:extLst>
-              <a:ext uri="{FF2B5EF4-FFF2-40B4-BE49-F238E27FC236}">
-                <a16:creationId xmlns:a16="http://schemas.microsoft.com/office/drawing/2014/main" id="{0DC5DCE3-107C-F8B6-21AF-F5EAAAD255A5}"/>
-              </a:ext>
-            </a:extLst>
-          </p:cNvPr>
-          <p:cNvCxnSpPr/>
-          <p:nvPr/>
-        </p:nvCxnSpPr>
-        <p:spPr>
-          <a:xfrm>
-            <a:off x="3675529" y="5845668"/>
-            <a:ext cx="4500283" cy="357032"/>
-          </a:xfrm>
-          <a:prstGeom prst="straightConnector1">
-            <a:avLst/>
-          </a:prstGeom>
-          <a:ln>
-            <a:tailEnd type="triangle"/>
-          </a:ln>
-        </p:spPr>
-        <p:style>
-          <a:lnRef idx="1">
-            <a:schemeClr val="accent1"/>
-          </a:lnRef>
-          <a:fillRef idx="0">
-            <a:schemeClr val="accent1"/>
-          </a:fillRef>
-          <a:effectRef idx="0">
-            <a:schemeClr val="accent1"/>
-          </a:effectRef>
-          <a:fontRef idx="minor">
-            <a:schemeClr val="tx1"/>
-          </a:fontRef>
-        </p:style>
-      </p:cxnSp>
-    </p:spTree>
-    <p:extLst>
-      <p:ext uri="{BB962C8B-B14F-4D97-AF65-F5344CB8AC3E}">
-        <p14:creationId xmlns:p14="http://schemas.microsoft.com/office/powerpoint/2010/main" val="976734512"/>
-      </p:ext>
-    </p:extLst>
-  </p:cSld>
-  <p:clrMapOvr>
-    <a:masterClrMapping/>
-  </p:clrMapOvr>
-</p:sld>
-</file>
-
-<file path=ppt/slides/slide11.xml><?xml version="1.0" encoding="utf-8"?>
-<p:sld xmlns:a="http://schemas.openxmlformats.org/drawingml/2006/main" xmlns:r="http://schemas.openxmlformats.org/officeDocument/2006/relationships" xmlns:p="http://schemas.openxmlformats.org/presentationml/2006/main">
-  <p:cSld>
-    <p:spTree>
-      <p:nvGrpSpPr>
-        <p:cNvPr id="1" name=""/>
-        <p:cNvGrpSpPr/>
-        <p:nvPr/>
-      </p:nvGrpSpPr>
-      <p:grpSpPr>
-        <a:xfrm>
-          <a:off x="0" y="0"/>
-          <a:ext cx="0" cy="0"/>
-          <a:chOff x="0" y="0"/>
-          <a:chExt cx="0" cy="0"/>
-        </a:xfrm>
-      </p:grpSpPr>
-      <p:sp>
-        <p:nvSpPr>
-          <p:cNvPr id="2" name="Text Placeholder 1">
-            <a:extLst>
-              <a:ext uri="{FF2B5EF4-FFF2-40B4-BE49-F238E27FC236}">
-                <a16:creationId xmlns:a16="http://schemas.microsoft.com/office/drawing/2014/main" id="{3A2823A6-D0C9-301B-C920-DCDB7EB68FD5}"/>
-              </a:ext>
-            </a:extLst>
-          </p:cNvPr>
-          <p:cNvSpPr>
-            <a:spLocks noGrp="1"/>
-          </p:cNvSpPr>
-          <p:nvPr>
-            <p:ph type="body" sz="quarter" idx="11"/>
-          </p:nvPr>
-        </p:nvSpPr>
-        <p:spPr/>
-        <p:txBody>
-          <a:bodyPr/>
-          <a:lstStyle/>
-          <a:p>
-            <a:r>
-              <a:rPr lang="zh-CN" altLang="en-US" dirty="0"/>
-              <a:t>接入 </a:t>
-            </a:r>
-            <a:r>
-              <a:rPr lang="en-US" altLang="zh-CN" dirty="0"/>
-              <a:t>/ 5 </a:t>
-            </a:r>
-            <a:r>
-              <a:rPr lang="zh-CN" altLang="en-US" dirty="0"/>
-              <a:t>编写启动脚本进行测试</a:t>
-            </a:r>
-          </a:p>
-        </p:txBody>
-      </p:sp>
-      <p:sp>
-        <p:nvSpPr>
-          <p:cNvPr id="3" name="Content Placeholder 2">
-            <a:extLst>
-              <a:ext uri="{FF2B5EF4-FFF2-40B4-BE49-F238E27FC236}">
-                <a16:creationId xmlns:a16="http://schemas.microsoft.com/office/drawing/2014/main" id="{3B4C2B07-7EE1-02F2-5380-401664DA7E3D}"/>
-              </a:ext>
-            </a:extLst>
-          </p:cNvPr>
-          <p:cNvSpPr>
-            <a:spLocks noGrp="1"/>
-          </p:cNvSpPr>
-          <p:nvPr>
-            <p:ph sz="quarter" idx="12"/>
-          </p:nvPr>
-        </p:nvSpPr>
-        <p:spPr/>
-        <p:txBody>
-          <a:bodyPr>
-            <a:normAutofit/>
-          </a:bodyPr>
-          <a:lstStyle/>
-          <a:p>
-            <a:r>
-              <a:rPr lang="zh-CN" altLang="en-US" dirty="0"/>
-              <a:t>为方便起见，你可以编写启动脚本（例如</a:t>
-            </a:r>
-            <a:r>
-              <a:rPr lang="en-US" altLang="zh-CN" dirty="0"/>
-              <a:t>pretest</a:t>
-            </a:r>
-            <a:r>
-              <a:rPr lang="zh-CN" altLang="en-US" dirty="0"/>
-              <a:t>等）来实现在每次代码功能修改</a:t>
-            </a:r>
-            <a:r>
-              <a:rPr lang="en-US" altLang="zh-CN" dirty="0"/>
-              <a:t>/</a:t>
-            </a:r>
-            <a:r>
-              <a:rPr lang="zh-CN" altLang="en-US" dirty="0"/>
-              <a:t>文档变动后重新生成测试用例文件和测试代码文件</a:t>
-            </a:r>
-            <a:endParaRPr lang="en-US" altLang="zh-CN" dirty="0"/>
-          </a:p>
-          <a:p>
-            <a:endParaRPr lang="en-US" altLang="zh-CN" dirty="0"/>
-          </a:p>
-          <a:p>
-            <a:endParaRPr lang="en-US" altLang="zh-CN" dirty="0"/>
-          </a:p>
-          <a:p>
-            <a:endParaRPr lang="en-US" altLang="zh-CN" dirty="0"/>
-          </a:p>
-          <a:p>
-            <a:endParaRPr lang="en-US" altLang="zh-CN" dirty="0"/>
-          </a:p>
-          <a:p>
-            <a:pPr marL="0" indent="0">
-              <a:buNone/>
-            </a:pPr>
-            <a:endParaRPr lang="en-US" altLang="zh-CN" dirty="0"/>
-          </a:p>
-          <a:p>
-            <a:r>
-              <a:rPr lang="zh-CN" altLang="en-US" dirty="0"/>
-              <a:t>注意：</a:t>
-            </a:r>
-            <a:endParaRPr lang="en-US" altLang="zh-CN" dirty="0"/>
-          </a:p>
-          <a:p>
-            <a:pPr lvl="1"/>
-            <a:r>
-              <a:rPr lang="zh-CN" altLang="en-US" dirty="0"/>
-              <a:t>你本地对</a:t>
-            </a:r>
-            <a:r>
-              <a:rPr lang="en-US" altLang="zh-CN" dirty="0"/>
-              <a:t>ENRE-</a:t>
-            </a:r>
-            <a:r>
-              <a:rPr lang="en-US" altLang="zh-CN" dirty="0" err="1"/>
-              <a:t>ts</a:t>
-            </a:r>
-            <a:r>
-              <a:rPr lang="zh-CN" altLang="en-US" dirty="0"/>
-              <a:t>所做的任何修改都不应该提交</a:t>
-            </a:r>
-            <a:r>
-              <a:rPr lang="en-US" altLang="zh-CN" dirty="0"/>
-              <a:t>PR</a:t>
-            </a:r>
-            <a:r>
-              <a:rPr lang="zh-CN" altLang="en-US" dirty="0"/>
-              <a:t>给</a:t>
-            </a:r>
-            <a:r>
-              <a:rPr lang="en-US" altLang="zh-CN" dirty="0"/>
-              <a:t>ENRE-</a:t>
-            </a:r>
-            <a:r>
-              <a:rPr lang="en-US" altLang="zh-CN" dirty="0" err="1"/>
-              <a:t>ts</a:t>
-            </a:r>
-            <a:endParaRPr lang="en-US" altLang="zh-CN" dirty="0"/>
-          </a:p>
-          <a:p>
-            <a:pPr lvl="1"/>
-            <a:r>
-              <a:rPr lang="zh-CN" altLang="en-US" dirty="0"/>
-              <a:t>也不建议完整提交你修改的</a:t>
-            </a:r>
-            <a:r>
-              <a:rPr lang="en-US" altLang="zh-CN" dirty="0"/>
-              <a:t>ENRE-</a:t>
-            </a:r>
-            <a:r>
-              <a:rPr lang="en-US" altLang="zh-CN" dirty="0" err="1"/>
-              <a:t>ts</a:t>
-            </a:r>
-            <a:r>
-              <a:rPr lang="zh-CN" altLang="en-US" dirty="0"/>
-              <a:t>到自己的</a:t>
-            </a:r>
-            <a:r>
-              <a:rPr lang="en-US" altLang="zh-CN" dirty="0"/>
-              <a:t>Git</a:t>
-            </a:r>
-            <a:r>
-              <a:rPr lang="zh-CN" altLang="en-US" dirty="0"/>
-              <a:t>仓库（这个问题以后会有解决方案）</a:t>
-            </a:r>
-            <a:endParaRPr lang="en-US" altLang="zh-CN" dirty="0"/>
-          </a:p>
-          <a:p>
-            <a:pPr lvl="1"/>
-            <a:r>
-              <a:rPr lang="zh-CN" altLang="en-US" dirty="0"/>
-              <a:t>但欢迎提交对</a:t>
-            </a:r>
-            <a:r>
-              <a:rPr lang="en-US" altLang="zh-CN" dirty="0"/>
-              <a:t>ENRE-</a:t>
-            </a:r>
-            <a:r>
-              <a:rPr lang="en-US" altLang="zh-CN" dirty="0" err="1"/>
-              <a:t>ts</a:t>
-            </a:r>
-            <a:r>
-              <a:rPr lang="zh-CN" altLang="en-US" dirty="0"/>
-              <a:t>测试框架中多语言通用部分的改进</a:t>
-            </a:r>
-            <a:r>
-              <a:rPr lang="en-US" altLang="zh-CN" dirty="0"/>
-              <a:t>PR</a:t>
-            </a:r>
-            <a:endParaRPr lang="zh-CN" altLang="en-US" dirty="0"/>
-          </a:p>
-        </p:txBody>
-      </p:sp>
-    </p:spTree>
-    <p:extLst>
-      <p:ext uri="{BB962C8B-B14F-4D97-AF65-F5344CB8AC3E}">
-        <p14:creationId xmlns:p14="http://schemas.microsoft.com/office/powerpoint/2010/main" val="2132368032"/>
-      </p:ext>
-    </p:extLst>
-  </p:cSld>
-  <p:clrMapOvr>
-    <a:masterClrMapping/>
-  </p:clrMapOvr>
-</p:sld>
-</file>
-
-<file path=ppt/slides/slide12.xml><?xml version="1.0" encoding="utf-8"?>
 <p:sld xmlns:a="http://schemas.openxmlformats.org/drawingml/2006/main" xmlns:r="http://schemas.openxmlformats.org/officeDocument/2006/relationships" xmlns:p="http://schemas.openxmlformats.org/presentationml/2006/main">
   <p:cSld>
     <p:spTree>
@@ -5643,7 +5053,7 @@
 </p:sld>
 </file>
 
-<file path=ppt/slides/slide13.xml><?xml version="1.0" encoding="utf-8"?>
+<file path=ppt/slides/slide11.xml><?xml version="1.0" encoding="utf-8"?>
 <p:sld xmlns:a="http://schemas.openxmlformats.org/drawingml/2006/main" xmlns:r="http://schemas.openxmlformats.org/officeDocument/2006/relationships" xmlns:p="http://schemas.openxmlformats.org/presentationml/2006/main">
   <p:cSld>
     <p:spTree>
@@ -6026,7 +5436,7 @@
 </p:sld>
 </file>
 
-<file path=ppt/slides/slide14.xml><?xml version="1.0" encoding="utf-8"?>
+<file path=ppt/slides/slide12.xml><?xml version="1.0" encoding="utf-8"?>
 <p:sld xmlns:a="http://schemas.openxmlformats.org/drawingml/2006/main" xmlns:r="http://schemas.openxmlformats.org/officeDocument/2006/relationships" xmlns:p="http://schemas.openxmlformats.org/presentationml/2006/main">
   <p:cSld>
     <p:spTree>
@@ -6070,7 +5480,7 @@
             </a:r>
             <a:r>
               <a:rPr lang="en-US" altLang="zh-CN" dirty="0"/>
-              <a:t>/ 6 </a:t>
+              <a:t>/ 4 </a:t>
             </a:r>
             <a:r>
               <a:rPr lang="zh-CN" altLang="en-US" dirty="0"/>
@@ -6905,7 +6315,7 @@
 </p:sld>
 </file>
 
-<file path=ppt/slides/slide15.xml><?xml version="1.0" encoding="utf-8"?>
+<file path=ppt/slides/slide13.xml><?xml version="1.0" encoding="utf-8"?>
 <p:sld xmlns:a="http://schemas.openxmlformats.org/drawingml/2006/main" xmlns:r="http://schemas.openxmlformats.org/officeDocument/2006/relationships" xmlns:p="http://schemas.openxmlformats.org/presentationml/2006/main">
   <p:cSld>
     <p:spTree>
@@ -6949,7 +6359,7 @@
             </a:r>
             <a:r>
               <a:rPr lang="en-US" altLang="zh-CN" dirty="0"/>
-              <a:t>/ 6 / </a:t>
+              <a:t>/ 4 / </a:t>
             </a:r>
             <a:r>
               <a:rPr lang="zh-CN" altLang="en-US" dirty="0"/>
@@ -7273,7 +6683,7 @@
 </p:sld>
 </file>
 
-<file path=ppt/slides/slide16.xml><?xml version="1.0" encoding="utf-8"?>
+<file path=ppt/slides/slide14.xml><?xml version="1.0" encoding="utf-8"?>
 <p:sld xmlns:a="http://schemas.openxmlformats.org/drawingml/2006/main" xmlns:r="http://schemas.openxmlformats.org/officeDocument/2006/relationships" xmlns:p="http://schemas.openxmlformats.org/presentationml/2006/main">
   <p:cSld>
     <p:spTree>
@@ -7318,7 +6728,7 @@
             </a:r>
             <a:r>
               <a:rPr lang="en-US" altLang="zh-CN" dirty="0"/>
-              <a:t>2023/4/19</a:t>
+              <a:t>2023/12/11</a:t>
             </a:r>
             <a:endParaRPr lang="zh-CN" altLang="en-US" dirty="0"/>
           </a:p>
@@ -7337,7 +6747,806 @@
 </p:sld>
 </file>
 
+<file path=ppt/slides/slide15.xml><?xml version="1.0" encoding="utf-8"?>
+<p:sld xmlns:a="http://schemas.openxmlformats.org/drawingml/2006/main" xmlns:r="http://schemas.openxmlformats.org/officeDocument/2006/relationships" xmlns:p="http://schemas.openxmlformats.org/presentationml/2006/main">
+  <p:cSld>
+    <p:spTree>
+      <p:nvGrpSpPr>
+        <p:cNvPr id="1" name=""/>
+        <p:cNvGrpSpPr/>
+        <p:nvPr/>
+      </p:nvGrpSpPr>
+      <p:grpSpPr>
+        <a:xfrm>
+          <a:off x="0" y="0"/>
+          <a:ext cx="0" cy="0"/>
+          <a:chOff x="0" y="0"/>
+          <a:chExt cx="0" cy="0"/>
+        </a:xfrm>
+      </p:grpSpPr>
+      <p:sp>
+        <p:nvSpPr>
+          <p:cNvPr id="2" name="Text Placeholder 1">
+            <a:extLst>
+              <a:ext uri="{FF2B5EF4-FFF2-40B4-BE49-F238E27FC236}">
+                <a16:creationId xmlns:a16="http://schemas.microsoft.com/office/drawing/2014/main" id="{E8245FC7-301A-6B18-7E3C-0BF5EC28C8D8}"/>
+              </a:ext>
+            </a:extLst>
+          </p:cNvPr>
+          <p:cNvSpPr>
+            <a:spLocks noGrp="1"/>
+          </p:cNvSpPr>
+          <p:nvPr>
+            <p:ph type="body" sz="quarter" idx="11"/>
+          </p:nvPr>
+        </p:nvSpPr>
+        <p:spPr/>
+        <p:txBody>
+          <a:bodyPr/>
+          <a:lstStyle/>
+          <a:p>
+            <a:r>
+              <a:rPr lang="zh-CN" altLang="en-US" dirty="0"/>
+              <a:t>参考：涉及到的</a:t>
+            </a:r>
+            <a:r>
+              <a:rPr lang="en-US" altLang="zh-CN" dirty="0"/>
+              <a:t>ENRE-</a:t>
+            </a:r>
+            <a:r>
+              <a:rPr lang="en-US" altLang="zh-CN" dirty="0" err="1"/>
+              <a:t>ts</a:t>
+            </a:r>
+            <a:r>
+              <a:rPr lang="zh-CN" altLang="en-US" dirty="0"/>
+              <a:t>组件</a:t>
+            </a:r>
+          </a:p>
+        </p:txBody>
+      </p:sp>
+      <p:graphicFrame>
+        <p:nvGraphicFramePr>
+          <p:cNvPr id="4" name="Table 4">
+            <a:extLst>
+              <a:ext uri="{FF2B5EF4-FFF2-40B4-BE49-F238E27FC236}">
+                <a16:creationId xmlns:a16="http://schemas.microsoft.com/office/drawing/2014/main" id="{7D162DAF-66CE-C503-41A6-C9C5EDEAC846}"/>
+              </a:ext>
+            </a:extLst>
+          </p:cNvPr>
+          <p:cNvGraphicFramePr>
+            <a:graphicFrameLocks noGrp="1"/>
+          </p:cNvGraphicFramePr>
+          <p:nvPr>
+            <p:extLst>
+              <p:ext uri="{D42A27DB-BD31-4B8C-83A1-F6EECF244321}">
+                <p14:modId xmlns:p14="http://schemas.microsoft.com/office/powerpoint/2010/main" val="4015662389"/>
+              </p:ext>
+            </p:extLst>
+          </p:nvPr>
+        </p:nvGraphicFramePr>
+        <p:xfrm>
+          <a:off x="364564" y="898960"/>
+          <a:ext cx="11468848" cy="5559514"/>
+        </p:xfrm>
+        <a:graphic>
+          <a:graphicData uri="http://schemas.openxmlformats.org/drawingml/2006/table">
+            <a:tbl>
+              <a:tblPr firstRow="1" bandRow="1">
+                <a:tableStyleId>{5C22544A-7EE6-4342-B048-85BDC9FD1C3A}</a:tableStyleId>
+              </a:tblPr>
+              <a:tblGrid>
+                <a:gridCol w="2867212">
+                  <a:extLst>
+                    <a:ext uri="{9D8B030D-6E8A-4147-A177-3AD203B41FA5}">
+                      <a16:colId xmlns:a16="http://schemas.microsoft.com/office/drawing/2014/main" val="791444198"/>
+                    </a:ext>
+                  </a:extLst>
+                </a:gridCol>
+                <a:gridCol w="2867212">
+                  <a:extLst>
+                    <a:ext uri="{9D8B030D-6E8A-4147-A177-3AD203B41FA5}">
+                      <a16:colId xmlns:a16="http://schemas.microsoft.com/office/drawing/2014/main" val="2887021855"/>
+                    </a:ext>
+                  </a:extLst>
+                </a:gridCol>
+                <a:gridCol w="2867212">
+                  <a:extLst>
+                    <a:ext uri="{9D8B030D-6E8A-4147-A177-3AD203B41FA5}">
+                      <a16:colId xmlns:a16="http://schemas.microsoft.com/office/drawing/2014/main" val="3669240739"/>
+                    </a:ext>
+                  </a:extLst>
+                </a:gridCol>
+                <a:gridCol w="2867212">
+                  <a:extLst>
+                    <a:ext uri="{9D8B030D-6E8A-4147-A177-3AD203B41FA5}">
+                      <a16:colId xmlns:a16="http://schemas.microsoft.com/office/drawing/2014/main" val="3751400608"/>
+                    </a:ext>
+                  </a:extLst>
+                </a:gridCol>
+              </a:tblGrid>
+              <a:tr h="382993">
+                <a:tc>
+                  <a:txBody>
+                    <a:bodyPr/>
+                    <a:lstStyle/>
+                    <a:p>
+                      <a:r>
+                        <a:rPr lang="zh-CN" altLang="en-US" dirty="0"/>
+                        <a:t>组件</a:t>
+                      </a:r>
+                    </a:p>
+                  </a:txBody>
+                  <a:tcPr/>
+                </a:tc>
+                <a:tc>
+                  <a:txBody>
+                    <a:bodyPr/>
+                    <a:lstStyle/>
+                    <a:p>
+                      <a:r>
+                        <a:rPr lang="zh-CN" altLang="en-US" dirty="0"/>
+                        <a:t>输入</a:t>
+                      </a:r>
+                    </a:p>
+                  </a:txBody>
+                  <a:tcPr/>
+                </a:tc>
+                <a:tc>
+                  <a:txBody>
+                    <a:bodyPr/>
+                    <a:lstStyle/>
+                    <a:p>
+                      <a:r>
+                        <a:rPr lang="zh-CN" altLang="en-US" dirty="0"/>
+                        <a:t>功能</a:t>
+                      </a:r>
+                    </a:p>
+                  </a:txBody>
+                  <a:tcPr/>
+                </a:tc>
+                <a:tc>
+                  <a:txBody>
+                    <a:bodyPr/>
+                    <a:lstStyle/>
+                    <a:p>
+                      <a:r>
+                        <a:rPr lang="zh-CN" altLang="en-US" dirty="0"/>
+                        <a:t>输出</a:t>
+                      </a:r>
+                    </a:p>
+                  </a:txBody>
+                  <a:tcPr/>
+                </a:tc>
+                <a:extLst>
+                  <a:ext uri="{0D108BD9-81ED-4DB2-BD59-A6C34878D82A}">
+                    <a16:rowId xmlns:a16="http://schemas.microsoft.com/office/drawing/2014/main" val="382114044"/>
+                  </a:ext>
+                </a:extLst>
+              </a:tr>
+              <a:tr h="1044787">
+                <a:tc>
+                  <a:txBody>
+                    <a:bodyPr/>
+                    <a:lstStyle/>
+                    <a:p>
+                      <a:r>
+                        <a:rPr lang="en-US" altLang="zh-CN" sz="1600" b="1" dirty="0"/>
+                        <a:t>@enre-ts/test-finder</a:t>
+                      </a:r>
+                    </a:p>
+                    <a:p>
+                      <a:r>
+                        <a:rPr lang="en-US" altLang="zh-CN" sz="1600" b="1" dirty="0"/>
+                        <a:t>(</a:t>
+                      </a:r>
+                      <a:r>
+                        <a:rPr lang="en-US" altLang="zh-CN" sz="1600" b="1" dirty="0" err="1"/>
+                        <a:t>enre</a:t>
+                      </a:r>
+                      <a:r>
+                        <a:rPr lang="en-US" altLang="zh-CN" sz="1600" b="1" dirty="0"/>
+                        <a:t>-test-finder)</a:t>
+                      </a:r>
+                      <a:endParaRPr lang="zh-CN" altLang="en-US" sz="1600" b="1" dirty="0"/>
+                    </a:p>
+                  </a:txBody>
+                  <a:tcPr/>
+                </a:tc>
+                <a:tc>
+                  <a:txBody>
+                    <a:bodyPr/>
+                    <a:lstStyle/>
+                    <a:p>
+                      <a:r>
+                        <a:rPr lang="en-US" altLang="zh-CN" sz="1600" dirty="0"/>
+                        <a:t>docs/README.md</a:t>
+                      </a:r>
+                    </a:p>
+                    <a:p>
+                      <a:r>
+                        <a:rPr lang="en-US" altLang="zh-CN" sz="1600" dirty="0"/>
+                        <a:t>tests/cases/*</a:t>
+                      </a:r>
+                      <a:endParaRPr lang="zh-CN" altLang="en-US" sz="1600" dirty="0"/>
+                    </a:p>
+                  </a:txBody>
+                  <a:tcPr/>
+                </a:tc>
+                <a:tc>
+                  <a:txBody>
+                    <a:bodyPr/>
+                    <a:lstStyle/>
+                    <a:p>
+                      <a:r>
+                        <a:rPr lang="zh-CN" altLang="en-US" sz="1600" dirty="0"/>
+                        <a:t>进行格式解析，确定所有实体依赖的种类名称</a:t>
+                      </a:r>
+                    </a:p>
+                  </a:txBody>
+                  <a:tcPr/>
+                </a:tc>
+                <a:tc>
+                  <a:txBody>
+                    <a:bodyPr/>
+                    <a:lstStyle/>
+                    <a:p>
+                      <a:r>
+                        <a:rPr lang="zh-CN" altLang="en-US" sz="1600" dirty="0"/>
+                        <a:t>实体种类列表；依赖种类列表；测试用例路径</a:t>
+                      </a:r>
+                    </a:p>
+                  </a:txBody>
+                  <a:tcPr/>
+                </a:tc>
+                <a:extLst>
+                  <a:ext uri="{0D108BD9-81ED-4DB2-BD59-A6C34878D82A}">
+                    <a16:rowId xmlns:a16="http://schemas.microsoft.com/office/drawing/2014/main" val="860067139"/>
+                  </a:ext>
+                </a:extLst>
+              </a:tr>
+              <a:tr h="1044787">
+                <a:tc>
+                  <a:txBody>
+                    <a:bodyPr/>
+                    <a:lstStyle/>
+                    <a:p>
+                      <a:r>
+                        <a:rPr lang="en-US" altLang="zh-CN" sz="1600" b="1" dirty="0"/>
+                        <a:t>@enre-ts/doc-parser</a:t>
+                      </a:r>
+                    </a:p>
+                    <a:p>
+                      <a:r>
+                        <a:rPr lang="en-US" altLang="zh-CN" sz="1600" b="1" dirty="0"/>
+                        <a:t>(</a:t>
+                      </a:r>
+                      <a:r>
+                        <a:rPr lang="en-US" altLang="zh-CN" sz="1600" b="1" dirty="0" err="1"/>
+                        <a:t>enre</a:t>
+                      </a:r>
+                      <a:r>
+                        <a:rPr lang="en-US" altLang="zh-CN" sz="1600" b="1" dirty="0"/>
+                        <a:t>-doc-parser)</a:t>
+                      </a:r>
+                      <a:endParaRPr lang="zh-CN" altLang="en-US" sz="1600" b="1" dirty="0"/>
+                    </a:p>
+                  </a:txBody>
+                  <a:tcPr/>
+                </a:tc>
+                <a:tc>
+                  <a:txBody>
+                    <a:bodyPr/>
+                    <a:lstStyle/>
+                    <a:p>
+                      <a:r>
+                        <a:rPr lang="zh-CN" altLang="en-US" sz="1600" dirty="0"/>
+                        <a:t>种类列表</a:t>
+                      </a:r>
+                    </a:p>
+                  </a:txBody>
+                  <a:tcPr/>
+                </a:tc>
+                <a:tc>
+                  <a:txBody>
+                    <a:bodyPr/>
+                    <a:lstStyle/>
+                    <a:p>
+                      <a:r>
+                        <a:rPr lang="zh-CN" altLang="en-US" sz="1600" dirty="0"/>
+                        <a:t>根据种类名</a:t>
+                      </a:r>
+                      <a:r>
+                        <a:rPr lang="en-US" altLang="zh-CN" sz="1600" dirty="0"/>
+                        <a:t>N</a:t>
+                      </a:r>
+                      <a:r>
+                        <a:rPr lang="zh-CN" altLang="en-US" sz="1600" dirty="0"/>
+                        <a:t>找到对应文档</a:t>
+                      </a:r>
+                      <a:r>
+                        <a:rPr lang="en-US" altLang="zh-CN" sz="1600" dirty="0"/>
+                        <a:t>docs/entity/N.md</a:t>
+                      </a:r>
+                      <a:r>
+                        <a:rPr lang="zh-CN" altLang="en-US" sz="1600" dirty="0"/>
+                        <a:t>，进行格式解析</a:t>
+                      </a:r>
+                    </a:p>
+                  </a:txBody>
+                  <a:tcPr/>
+                </a:tc>
+                <a:tc>
+                  <a:txBody>
+                    <a:bodyPr/>
+                    <a:lstStyle/>
+                    <a:p>
+                      <a:r>
+                        <a:rPr lang="zh-CN" altLang="en-US" sz="1600" dirty="0"/>
+                        <a:t>对应文档的数据结构（测试组名称，</a:t>
+                      </a:r>
+                      <a:r>
+                        <a:rPr lang="en-US" altLang="zh-CN" sz="1600" dirty="0"/>
+                        <a:t>[</a:t>
+                      </a:r>
+                      <a:r>
+                        <a:rPr lang="zh-CN" altLang="en-US" sz="1600" dirty="0"/>
+                        <a:t>测试用例（</a:t>
+                      </a:r>
+                      <a:r>
+                        <a:rPr lang="en-US" altLang="zh-CN" sz="1600" dirty="0"/>
+                        <a:t>[</a:t>
+                      </a:r>
+                      <a:r>
+                        <a:rPr lang="zh-CN" altLang="en-US" sz="1600" dirty="0"/>
+                        <a:t>代码</a:t>
+                      </a:r>
+                      <a:r>
+                        <a:rPr lang="en-US" altLang="zh-CN" sz="1600" dirty="0"/>
+                        <a:t>]</a:t>
+                      </a:r>
+                      <a:r>
+                        <a:rPr lang="zh-CN" altLang="en-US" sz="1600" dirty="0"/>
+                        <a:t>，</a:t>
+                      </a:r>
+                      <a:r>
+                        <a:rPr lang="en-US" altLang="zh-CN" sz="1600" dirty="0"/>
+                        <a:t>Assertion</a:t>
+                      </a:r>
+                      <a:r>
+                        <a:rPr lang="zh-CN" altLang="en-US" sz="1600" dirty="0"/>
+                        <a:t>）</a:t>
+                      </a:r>
+                      <a:r>
+                        <a:rPr lang="en-US" altLang="zh-CN" sz="1600" dirty="0"/>
+                        <a:t>]</a:t>
+                      </a:r>
+                      <a:r>
+                        <a:rPr lang="zh-CN" altLang="en-US" sz="1600" dirty="0"/>
+                        <a:t>）</a:t>
+                      </a:r>
+                    </a:p>
+                  </a:txBody>
+                  <a:tcPr/>
+                </a:tc>
+                <a:extLst>
+                  <a:ext uri="{0D108BD9-81ED-4DB2-BD59-A6C34878D82A}">
+                    <a16:rowId xmlns:a16="http://schemas.microsoft.com/office/drawing/2014/main" val="1972371418"/>
+                  </a:ext>
+                </a:extLst>
+              </a:tr>
+              <a:tr h="1044787">
+                <a:tc>
+                  <a:txBody>
+                    <a:bodyPr/>
+                    <a:lstStyle/>
+                    <a:p>
+                      <a:r>
+                        <a:rPr lang="en-US" altLang="zh-CN" sz="1600" b="1" dirty="0">
+                          <a:solidFill>
+                            <a:schemeClr val="tx1"/>
+                          </a:solidFill>
+                        </a:rPr>
+                        <a:t>@enre-ts/doc-validator</a:t>
+                      </a:r>
+                    </a:p>
+                    <a:p>
+                      <a:r>
+                        <a:rPr lang="en-US" altLang="zh-CN" sz="1600" b="1" dirty="0">
+                          <a:solidFill>
+                            <a:schemeClr val="tx1"/>
+                          </a:solidFill>
+                        </a:rPr>
+                        <a:t>(</a:t>
+                      </a:r>
+                      <a:r>
+                        <a:rPr lang="en-US" altLang="zh-CN" sz="1600" b="1" dirty="0" err="1">
+                          <a:solidFill>
+                            <a:schemeClr val="tx1"/>
+                          </a:solidFill>
+                        </a:rPr>
+                        <a:t>enre</a:t>
+                      </a:r>
+                      <a:r>
+                        <a:rPr lang="en-US" altLang="zh-CN" sz="1600" b="1" dirty="0">
+                          <a:solidFill>
+                            <a:schemeClr val="tx1"/>
+                          </a:solidFill>
+                        </a:rPr>
+                        <a:t>-doc-validator)</a:t>
+                      </a:r>
+                      <a:endParaRPr lang="zh-CN" altLang="en-US" sz="1600" b="1" dirty="0">
+                        <a:solidFill>
+                          <a:schemeClr val="tx1"/>
+                        </a:solidFill>
+                      </a:endParaRPr>
+                    </a:p>
+                  </a:txBody>
+                  <a:tcPr/>
+                </a:tc>
+                <a:tc>
+                  <a:txBody>
+                    <a:bodyPr/>
+                    <a:lstStyle/>
+                    <a:p>
+                      <a:r>
+                        <a:rPr lang="zh-CN" altLang="en-US" sz="1600" dirty="0"/>
+                        <a:t>文档数据结构</a:t>
+                      </a:r>
+                    </a:p>
+                  </a:txBody>
+                  <a:tcPr/>
+                </a:tc>
+                <a:tc>
+                  <a:txBody>
+                    <a:bodyPr/>
+                    <a:lstStyle/>
+                    <a:p>
+                      <a:r>
+                        <a:rPr lang="zh-CN" altLang="en-US" sz="1600" dirty="0"/>
+                        <a:t>进行格式检查，以确定</a:t>
+                      </a:r>
+                      <a:r>
+                        <a:rPr lang="en-US" altLang="zh-CN" sz="1600" dirty="0"/>
+                        <a:t>Assertion</a:t>
+                      </a:r>
+                      <a:r>
+                        <a:rPr lang="zh-CN" altLang="en-US" sz="1600" dirty="0"/>
+                        <a:t>等符合所定义的语法规范；补全缺省的值</a:t>
+                      </a:r>
+                    </a:p>
+                  </a:txBody>
+                  <a:tcPr/>
+                </a:tc>
+                <a:tc>
+                  <a:txBody>
+                    <a:bodyPr/>
+                    <a:lstStyle/>
+                    <a:p>
+                      <a:r>
+                        <a:rPr lang="zh-CN" altLang="en-US" sz="1600" dirty="0"/>
+                        <a:t>格式良好的文档数据结构</a:t>
+                      </a:r>
+                    </a:p>
+                  </a:txBody>
+                  <a:tcPr/>
+                </a:tc>
+                <a:extLst>
+                  <a:ext uri="{0D108BD9-81ED-4DB2-BD59-A6C34878D82A}">
+                    <a16:rowId xmlns:a16="http://schemas.microsoft.com/office/drawing/2014/main" val="993146130"/>
+                  </a:ext>
+                </a:extLst>
+              </a:tr>
+              <a:tr h="1044787">
+                <a:tc>
+                  <a:txBody>
+                    <a:bodyPr/>
+                    <a:lstStyle/>
+                    <a:p>
+                      <a:r>
+                        <a:rPr lang="en-US" altLang="zh-CN" sz="1600" b="1" dirty="0">
+                          <a:solidFill>
+                            <a:schemeClr val="tx1"/>
+                          </a:solidFill>
+                        </a:rPr>
+                        <a:t>@enre-ts/test-generator</a:t>
+                      </a:r>
+                    </a:p>
+                    <a:p>
+                      <a:r>
+                        <a:rPr lang="en-US" altLang="zh-CN" sz="1600" b="1" dirty="0">
+                          <a:solidFill>
+                            <a:schemeClr val="tx1"/>
+                          </a:solidFill>
+                        </a:rPr>
+                        <a:t>(</a:t>
+                      </a:r>
+                      <a:r>
+                        <a:rPr lang="en-US" altLang="zh-CN" sz="1600" b="1" dirty="0" err="1">
+                          <a:solidFill>
+                            <a:schemeClr val="tx1"/>
+                          </a:solidFill>
+                        </a:rPr>
+                        <a:t>enre</a:t>
+                      </a:r>
+                      <a:r>
+                        <a:rPr lang="en-US" altLang="zh-CN" sz="1600" b="1" dirty="0">
+                          <a:solidFill>
+                            <a:schemeClr val="tx1"/>
+                          </a:solidFill>
+                        </a:rPr>
+                        <a:t>-test-generator)</a:t>
+                      </a:r>
+                      <a:endParaRPr lang="zh-CN" altLang="en-US" sz="1600" b="1" dirty="0">
+                        <a:solidFill>
+                          <a:schemeClr val="tx1"/>
+                        </a:solidFill>
+                      </a:endParaRPr>
+                    </a:p>
+                  </a:txBody>
+                  <a:tcPr/>
+                </a:tc>
+                <a:tc>
+                  <a:txBody>
+                    <a:bodyPr/>
+                    <a:lstStyle/>
+                    <a:p>
+                      <a:r>
+                        <a:rPr lang="zh-CN" altLang="en-US" sz="1600" dirty="0"/>
+                        <a:t>格式良好的文档数据结构</a:t>
+                      </a:r>
+                    </a:p>
+                  </a:txBody>
+                  <a:tcPr/>
+                </a:tc>
+                <a:tc>
+                  <a:txBody>
+                    <a:bodyPr/>
+                    <a:lstStyle/>
+                    <a:p>
+                      <a:r>
+                        <a:rPr lang="zh-CN" altLang="en-US" sz="1600" dirty="0"/>
+                        <a:t>根据测试组名称</a:t>
+                      </a:r>
+                      <a:r>
+                        <a:rPr lang="en-US" altLang="zh-CN" sz="1600" dirty="0"/>
+                        <a:t>G</a:t>
+                      </a:r>
+                      <a:r>
+                        <a:rPr lang="zh-CN" altLang="en-US" sz="1600" dirty="0"/>
+                        <a:t>创建</a:t>
+                      </a:r>
+                      <a:r>
+                        <a:rPr lang="en-US" altLang="zh-CN" sz="1600" dirty="0"/>
+                        <a:t>tests/cases/_G</a:t>
+                      </a:r>
+                      <a:r>
+                        <a:rPr lang="zh-CN" altLang="en-US" sz="1600" dirty="0"/>
+                        <a:t>路径；</a:t>
+                      </a:r>
+                      <a:endParaRPr lang="en-US" altLang="zh-CN" sz="1600" dirty="0"/>
+                    </a:p>
+                    <a:p>
+                      <a:r>
+                        <a:rPr lang="zh-CN" altLang="en-US" sz="1600" dirty="0"/>
+                        <a:t>对每个测试用例，根据测试用例名称</a:t>
+                      </a:r>
+                      <a:r>
+                        <a:rPr lang="en-US" altLang="zh-CN" sz="1600" dirty="0"/>
+                        <a:t>T</a:t>
+                      </a:r>
+                      <a:r>
+                        <a:rPr lang="zh-CN" altLang="en-US" sz="1600" dirty="0"/>
+                        <a:t>创建</a:t>
+                      </a:r>
+                      <a:r>
+                        <a:rPr lang="en-US" altLang="zh-CN" sz="1600" dirty="0"/>
+                        <a:t>tests/cases/_G/_T</a:t>
+                      </a:r>
+                      <a:r>
+                        <a:rPr lang="zh-CN" altLang="en-US" sz="1600" dirty="0"/>
+                        <a:t>路径，其下存放所有测试代码文件；</a:t>
+                      </a:r>
+                      <a:endParaRPr lang="en-US" altLang="zh-CN" sz="1600" dirty="0"/>
+                    </a:p>
+                    <a:p>
+                      <a:r>
+                        <a:rPr lang="zh-CN" altLang="en-US" sz="1600" dirty="0"/>
+                        <a:t>根据</a:t>
+                      </a:r>
+                      <a:r>
+                        <a:rPr lang="en-US" altLang="zh-CN" sz="1600" dirty="0"/>
+                        <a:t>Assertion</a:t>
+                      </a:r>
+                      <a:r>
+                        <a:rPr lang="zh-CN" altLang="en-US" sz="1600" dirty="0"/>
+                        <a:t>自动生成特定测试框架的测试代码</a:t>
+                      </a:r>
+                    </a:p>
+                  </a:txBody>
+                  <a:tcPr/>
+                </a:tc>
+                <a:tc>
+                  <a:txBody>
+                    <a:bodyPr/>
+                    <a:lstStyle/>
+                    <a:p>
+                      <a:r>
+                        <a:rPr lang="en-US" altLang="zh-CN" sz="1600" dirty="0"/>
+                        <a:t>cases</a:t>
+                      </a:r>
+                      <a:r>
+                        <a:rPr lang="zh-CN" altLang="en-US" sz="1600" dirty="0"/>
+                        <a:t>和</a:t>
+                      </a:r>
+                      <a:r>
+                        <a:rPr lang="en-US" altLang="zh-CN" sz="1600" dirty="0"/>
+                        <a:t>suites</a:t>
+                      </a:r>
+                      <a:r>
+                        <a:rPr lang="zh-CN" altLang="en-US" sz="1600" dirty="0"/>
+                        <a:t>（一个</a:t>
+                      </a:r>
+                      <a:r>
+                        <a:rPr lang="en-US" altLang="zh-CN" sz="1600" dirty="0"/>
+                        <a:t>suite</a:t>
+                      </a:r>
+                      <a:r>
+                        <a:rPr lang="zh-CN" altLang="en-US" sz="1600" dirty="0"/>
+                        <a:t>文件就是一组可执行测试用例）</a:t>
+                      </a:r>
+                    </a:p>
+                  </a:txBody>
+                  <a:tcPr/>
+                </a:tc>
+                <a:extLst>
+                  <a:ext uri="{0D108BD9-81ED-4DB2-BD59-A6C34878D82A}">
+                    <a16:rowId xmlns:a16="http://schemas.microsoft.com/office/drawing/2014/main" val="1560644052"/>
+                  </a:ext>
+                </a:extLst>
+              </a:tr>
+            </a:tbl>
+          </a:graphicData>
+        </a:graphic>
+      </p:graphicFrame>
+    </p:spTree>
+    <p:extLst>
+      <p:ext uri="{BB962C8B-B14F-4D97-AF65-F5344CB8AC3E}">
+        <p14:creationId xmlns:p14="http://schemas.microsoft.com/office/powerpoint/2010/main" val="1285398028"/>
+      </p:ext>
+    </p:extLst>
+  </p:cSld>
+  <p:clrMapOvr>
+    <a:masterClrMapping/>
+  </p:clrMapOvr>
+</p:sld>
+</file>
+
 <file path=ppt/slides/slide2.xml><?xml version="1.0" encoding="utf-8"?>
+<p:sld xmlns:a="http://schemas.openxmlformats.org/drawingml/2006/main" xmlns:r="http://schemas.openxmlformats.org/officeDocument/2006/relationships" xmlns:p="http://schemas.openxmlformats.org/presentationml/2006/main">
+  <p:cSld>
+    <p:spTree>
+      <p:nvGrpSpPr>
+        <p:cNvPr id="1" name=""/>
+        <p:cNvGrpSpPr/>
+        <p:nvPr/>
+      </p:nvGrpSpPr>
+      <p:grpSpPr>
+        <a:xfrm>
+          <a:off x="0" y="0"/>
+          <a:ext cx="0" cy="0"/>
+          <a:chOff x="0" y="0"/>
+          <a:chExt cx="0" cy="0"/>
+        </a:xfrm>
+      </p:grpSpPr>
+      <p:sp>
+        <p:nvSpPr>
+          <p:cNvPr id="2" name="Text Placeholder 1">
+            <a:extLst>
+              <a:ext uri="{FF2B5EF4-FFF2-40B4-BE49-F238E27FC236}">
+                <a16:creationId xmlns:a16="http://schemas.microsoft.com/office/drawing/2014/main" id="{818341BB-68B1-5047-D816-8ADCA923656B}"/>
+              </a:ext>
+            </a:extLst>
+          </p:cNvPr>
+          <p:cNvSpPr>
+            <a:spLocks noGrp="1"/>
+          </p:cNvSpPr>
+          <p:nvPr>
+            <p:ph type="body" sz="quarter" idx="11"/>
+          </p:nvPr>
+        </p:nvSpPr>
+        <p:spPr/>
+        <p:txBody>
+          <a:bodyPr/>
+          <a:lstStyle/>
+          <a:p>
+            <a:r>
+              <a:rPr lang="zh-CN" altLang="en-US" dirty="0"/>
+              <a:t>更新日志</a:t>
+            </a:r>
+          </a:p>
+        </p:txBody>
+      </p:sp>
+      <p:sp>
+        <p:nvSpPr>
+          <p:cNvPr id="4" name="Content Placeholder 3">
+            <a:extLst>
+              <a:ext uri="{FF2B5EF4-FFF2-40B4-BE49-F238E27FC236}">
+                <a16:creationId xmlns:a16="http://schemas.microsoft.com/office/drawing/2014/main" id="{5C9D85E7-AC61-00F6-F030-805D1DACA7BA}"/>
+              </a:ext>
+            </a:extLst>
+          </p:cNvPr>
+          <p:cNvSpPr>
+            <a:spLocks noGrp="1"/>
+          </p:cNvSpPr>
+          <p:nvPr>
+            <p:ph sz="quarter" idx="12"/>
+          </p:nvPr>
+        </p:nvSpPr>
+        <p:spPr/>
+        <p:txBody>
+          <a:bodyPr/>
+          <a:lstStyle/>
+          <a:p>
+            <a:r>
+              <a:rPr lang="en-US" altLang="zh-CN" dirty="0"/>
+              <a:t>V2.0</a:t>
+            </a:r>
+          </a:p>
+          <a:p>
+            <a:pPr lvl="1"/>
+            <a:r>
+              <a:rPr lang="zh-CN" altLang="en-US" dirty="0"/>
+              <a:t>更新了不侵入式修改 </a:t>
+            </a:r>
+            <a:r>
+              <a:rPr lang="en-US" altLang="zh-CN" dirty="0"/>
+              <a:t>ENRE-</a:t>
+            </a:r>
+            <a:r>
+              <a:rPr lang="en-US" altLang="zh-CN" dirty="0" err="1"/>
+              <a:t>ts</a:t>
+            </a:r>
+            <a:r>
+              <a:rPr lang="en-US" altLang="zh-CN" dirty="0"/>
+              <a:t> </a:t>
+            </a:r>
+            <a:r>
+              <a:rPr lang="zh-CN" altLang="en-US" dirty="0"/>
+              <a:t>的新测试框架的用法</a:t>
+            </a:r>
+            <a:endParaRPr lang="en-US" altLang="zh-CN" dirty="0"/>
+          </a:p>
+          <a:p>
+            <a:pPr lvl="1"/>
+            <a:r>
+              <a:rPr lang="zh-CN" altLang="en-US" dirty="0"/>
+              <a:t>更新了匿名实体的名字字符串语法，请务必参考以下链接以同步新语法</a:t>
+            </a:r>
+            <a:endParaRPr lang="en-US" altLang="zh-CN" dirty="0"/>
+          </a:p>
+          <a:p>
+            <a:pPr lvl="2"/>
+            <a:r>
+              <a:rPr lang="en-US" altLang="zh-CN" sz="1200" dirty="0"/>
+              <a:t>https://github.com/xjtu-enre/ENRE-ts/blob/d09e088f40bf4abba6c403c65ad4ee25e7ab782b/packages/enre-naming/README.md</a:t>
+            </a:r>
+          </a:p>
+        </p:txBody>
+      </p:sp>
+    </p:spTree>
+    <p:extLst>
+      <p:ext uri="{BB962C8B-B14F-4D97-AF65-F5344CB8AC3E}">
+        <p14:creationId xmlns:p14="http://schemas.microsoft.com/office/powerpoint/2010/main" val="4223607563"/>
+      </p:ext>
+    </p:extLst>
+  </p:cSld>
+  <p:clrMapOvr>
+    <a:masterClrMapping/>
+  </p:clrMapOvr>
+</p:sld>
+</file>
+
+<file path=ppt/slides/slide3.xml><?xml version="1.0" encoding="utf-8"?>
 <p:sld xmlns:a="http://schemas.openxmlformats.org/drawingml/2006/main" xmlns:r="http://schemas.openxmlformats.org/officeDocument/2006/relationships" xmlns:p="http://schemas.openxmlformats.org/presentationml/2006/main">
   <p:cSld>
     <p:spTree>
@@ -7600,7 +7809,7 @@
 </p:sld>
 </file>
 
-<file path=ppt/slides/slide3.xml><?xml version="1.0" encoding="utf-8"?>
+<file path=ppt/slides/slide4.xml><?xml version="1.0" encoding="utf-8"?>
 <p:sld xmlns:a="http://schemas.openxmlformats.org/drawingml/2006/main" xmlns:r="http://schemas.openxmlformats.org/officeDocument/2006/relationships" xmlns:p="http://schemas.openxmlformats.org/presentationml/2006/main">
   <p:cSld>
     <p:spTree>
@@ -7655,6 +7864,15 @@
                 <a:sym typeface="+mn-lt"/>
               </a:rPr>
               <a:t>ts</a:t>
+            </a:r>
+            <a:r>
+              <a:rPr lang="en-US" altLang="zh-CN" dirty="0">
+                <a:latin typeface="+mn-lt"/>
+                <a:ea typeface="+mn-ea"/>
+                <a:cs typeface="+mn-ea"/>
+                <a:sym typeface="+mn-lt"/>
+              </a:rPr>
+              <a:t> </a:t>
             </a:r>
             <a:r>
               <a:rPr lang="zh-CN" altLang="en-US" dirty="0">
@@ -10324,618 +10542,6 @@
 </p:sld>
 </file>
 
-<file path=ppt/slides/slide4.xml><?xml version="1.0" encoding="utf-8"?>
-<p:sld xmlns:a="http://schemas.openxmlformats.org/drawingml/2006/main" xmlns:r="http://schemas.openxmlformats.org/officeDocument/2006/relationships" xmlns:p="http://schemas.openxmlformats.org/presentationml/2006/main">
-  <p:cSld>
-    <p:spTree>
-      <p:nvGrpSpPr>
-        <p:cNvPr id="1" name=""/>
-        <p:cNvGrpSpPr/>
-        <p:nvPr/>
-      </p:nvGrpSpPr>
-      <p:grpSpPr>
-        <a:xfrm>
-          <a:off x="0" y="0"/>
-          <a:ext cx="0" cy="0"/>
-          <a:chOff x="0" y="0"/>
-          <a:chExt cx="0" cy="0"/>
-        </a:xfrm>
-      </p:grpSpPr>
-      <p:sp>
-        <p:nvSpPr>
-          <p:cNvPr id="2" name="Text Placeholder 1">
-            <a:extLst>
-              <a:ext uri="{FF2B5EF4-FFF2-40B4-BE49-F238E27FC236}">
-                <a16:creationId xmlns:a16="http://schemas.microsoft.com/office/drawing/2014/main" id="{E8245FC7-301A-6B18-7E3C-0BF5EC28C8D8}"/>
-              </a:ext>
-            </a:extLst>
-          </p:cNvPr>
-          <p:cNvSpPr>
-            <a:spLocks noGrp="1"/>
-          </p:cNvSpPr>
-          <p:nvPr>
-            <p:ph type="body" sz="quarter" idx="11"/>
-          </p:nvPr>
-        </p:nvSpPr>
-        <p:spPr/>
-        <p:txBody>
-          <a:bodyPr/>
-          <a:lstStyle/>
-          <a:p>
-            <a:r>
-              <a:rPr lang="zh-CN" altLang="en-US" dirty="0"/>
-              <a:t>涉及到的</a:t>
-            </a:r>
-            <a:r>
-              <a:rPr lang="en-US" altLang="zh-CN" dirty="0"/>
-              <a:t>ENRE-</a:t>
-            </a:r>
-            <a:r>
-              <a:rPr lang="en-US" altLang="zh-CN" dirty="0" err="1"/>
-              <a:t>ts</a:t>
-            </a:r>
-            <a:r>
-              <a:rPr lang="zh-CN" altLang="en-US" dirty="0"/>
-              <a:t>组件</a:t>
-            </a:r>
-          </a:p>
-        </p:txBody>
-      </p:sp>
-      <p:graphicFrame>
-        <p:nvGraphicFramePr>
-          <p:cNvPr id="4" name="Table 4">
-            <a:extLst>
-              <a:ext uri="{FF2B5EF4-FFF2-40B4-BE49-F238E27FC236}">
-                <a16:creationId xmlns:a16="http://schemas.microsoft.com/office/drawing/2014/main" id="{7D162DAF-66CE-C503-41A6-C9C5EDEAC846}"/>
-              </a:ext>
-            </a:extLst>
-          </p:cNvPr>
-          <p:cNvGraphicFramePr>
-            <a:graphicFrameLocks noGrp="1"/>
-          </p:cNvGraphicFramePr>
-          <p:nvPr>
-            <p:extLst>
-              <p:ext uri="{D42A27DB-BD31-4B8C-83A1-F6EECF244321}">
-                <p14:modId xmlns:p14="http://schemas.microsoft.com/office/powerpoint/2010/main" val="3700740108"/>
-              </p:ext>
-            </p:extLst>
-          </p:nvPr>
-        </p:nvGraphicFramePr>
-        <p:xfrm>
-          <a:off x="364564" y="898960"/>
-          <a:ext cx="11468848" cy="5559514"/>
-        </p:xfrm>
-        <a:graphic>
-          <a:graphicData uri="http://schemas.openxmlformats.org/drawingml/2006/table">
-            <a:tbl>
-              <a:tblPr firstRow="1" bandRow="1">
-                <a:tableStyleId>{5C22544A-7EE6-4342-B048-85BDC9FD1C3A}</a:tableStyleId>
-              </a:tblPr>
-              <a:tblGrid>
-                <a:gridCol w="2867212">
-                  <a:extLst>
-                    <a:ext uri="{9D8B030D-6E8A-4147-A177-3AD203B41FA5}">
-                      <a16:colId xmlns:a16="http://schemas.microsoft.com/office/drawing/2014/main" val="791444198"/>
-                    </a:ext>
-                  </a:extLst>
-                </a:gridCol>
-                <a:gridCol w="2867212">
-                  <a:extLst>
-                    <a:ext uri="{9D8B030D-6E8A-4147-A177-3AD203B41FA5}">
-                      <a16:colId xmlns:a16="http://schemas.microsoft.com/office/drawing/2014/main" val="2887021855"/>
-                    </a:ext>
-                  </a:extLst>
-                </a:gridCol>
-                <a:gridCol w="2867212">
-                  <a:extLst>
-                    <a:ext uri="{9D8B030D-6E8A-4147-A177-3AD203B41FA5}">
-                      <a16:colId xmlns:a16="http://schemas.microsoft.com/office/drawing/2014/main" val="3669240739"/>
-                    </a:ext>
-                  </a:extLst>
-                </a:gridCol>
-                <a:gridCol w="2867212">
-                  <a:extLst>
-                    <a:ext uri="{9D8B030D-6E8A-4147-A177-3AD203B41FA5}">
-                      <a16:colId xmlns:a16="http://schemas.microsoft.com/office/drawing/2014/main" val="3751400608"/>
-                    </a:ext>
-                  </a:extLst>
-                </a:gridCol>
-              </a:tblGrid>
-              <a:tr h="382993">
-                <a:tc>
-                  <a:txBody>
-                    <a:bodyPr/>
-                    <a:lstStyle/>
-                    <a:p>
-                      <a:r>
-                        <a:rPr lang="zh-CN" altLang="en-US" dirty="0"/>
-                        <a:t>组件</a:t>
-                      </a:r>
-                    </a:p>
-                  </a:txBody>
-                  <a:tcPr/>
-                </a:tc>
-                <a:tc>
-                  <a:txBody>
-                    <a:bodyPr/>
-                    <a:lstStyle/>
-                    <a:p>
-                      <a:r>
-                        <a:rPr lang="zh-CN" altLang="en-US" dirty="0"/>
-                        <a:t>输入</a:t>
-                      </a:r>
-                    </a:p>
-                  </a:txBody>
-                  <a:tcPr/>
-                </a:tc>
-                <a:tc>
-                  <a:txBody>
-                    <a:bodyPr/>
-                    <a:lstStyle/>
-                    <a:p>
-                      <a:r>
-                        <a:rPr lang="zh-CN" altLang="en-US" dirty="0"/>
-                        <a:t>功能</a:t>
-                      </a:r>
-                    </a:p>
-                  </a:txBody>
-                  <a:tcPr/>
-                </a:tc>
-                <a:tc>
-                  <a:txBody>
-                    <a:bodyPr/>
-                    <a:lstStyle/>
-                    <a:p>
-                      <a:r>
-                        <a:rPr lang="zh-CN" altLang="en-US" dirty="0"/>
-                        <a:t>输出</a:t>
-                      </a:r>
-                    </a:p>
-                  </a:txBody>
-                  <a:tcPr/>
-                </a:tc>
-                <a:extLst>
-                  <a:ext uri="{0D108BD9-81ED-4DB2-BD59-A6C34878D82A}">
-                    <a16:rowId xmlns:a16="http://schemas.microsoft.com/office/drawing/2014/main" val="382114044"/>
-                  </a:ext>
-                </a:extLst>
-              </a:tr>
-              <a:tr h="1044787">
-                <a:tc>
-                  <a:txBody>
-                    <a:bodyPr/>
-                    <a:lstStyle/>
-                    <a:p>
-                      <a:r>
-                        <a:rPr lang="en-US" altLang="zh-CN" sz="1600" b="1" dirty="0" err="1"/>
-                        <a:t>enre</a:t>
-                      </a:r>
-                      <a:r>
-                        <a:rPr lang="en-US" altLang="zh-CN" sz="1600" b="1" dirty="0"/>
-                        <a:t>-doc-path-finder</a:t>
-                      </a:r>
-                      <a:endParaRPr lang="zh-CN" altLang="en-US" sz="1600" b="1" dirty="0"/>
-                    </a:p>
-                  </a:txBody>
-                  <a:tcPr/>
-                </a:tc>
-                <a:tc>
-                  <a:txBody>
-                    <a:bodyPr/>
-                    <a:lstStyle/>
-                    <a:p>
-                      <a:r>
-                        <a:rPr lang="en-US" altLang="zh-CN" sz="1600" dirty="0"/>
-                        <a:t>docs/README.md</a:t>
-                      </a:r>
-                      <a:endParaRPr lang="zh-CN" altLang="en-US" sz="1600" dirty="0"/>
-                    </a:p>
-                  </a:txBody>
-                  <a:tcPr/>
-                </a:tc>
-                <a:tc>
-                  <a:txBody>
-                    <a:bodyPr/>
-                    <a:lstStyle/>
-                    <a:p>
-                      <a:r>
-                        <a:rPr lang="zh-CN" altLang="en-US" sz="1600" dirty="0"/>
-                        <a:t>进行格式解析，确定所有实体依赖的种类名称</a:t>
-                      </a:r>
-                    </a:p>
-                  </a:txBody>
-                  <a:tcPr/>
-                </a:tc>
-                <a:tc>
-                  <a:txBody>
-                    <a:bodyPr/>
-                    <a:lstStyle/>
-                    <a:p>
-                      <a:r>
-                        <a:rPr lang="zh-CN" altLang="en-US" sz="1600" dirty="0"/>
-                        <a:t>实体种类列表；依赖种类列表</a:t>
-                      </a:r>
-                    </a:p>
-                  </a:txBody>
-                  <a:tcPr/>
-                </a:tc>
-                <a:extLst>
-                  <a:ext uri="{0D108BD9-81ED-4DB2-BD59-A6C34878D82A}">
-                    <a16:rowId xmlns:a16="http://schemas.microsoft.com/office/drawing/2014/main" val="860067139"/>
-                  </a:ext>
-                </a:extLst>
-              </a:tr>
-              <a:tr h="1044787">
-                <a:tc>
-                  <a:txBody>
-                    <a:bodyPr/>
-                    <a:lstStyle/>
-                    <a:p>
-                      <a:r>
-                        <a:rPr lang="en-US" altLang="zh-CN" sz="1600" b="1" dirty="0" err="1"/>
-                        <a:t>enre</a:t>
-                      </a:r>
-                      <a:r>
-                        <a:rPr lang="en-US" altLang="zh-CN" sz="1600" b="1" dirty="0"/>
-                        <a:t>-doc-parser</a:t>
-                      </a:r>
-                      <a:endParaRPr lang="zh-CN" altLang="en-US" sz="1600" b="1" dirty="0"/>
-                    </a:p>
-                  </a:txBody>
-                  <a:tcPr/>
-                </a:tc>
-                <a:tc>
-                  <a:txBody>
-                    <a:bodyPr/>
-                    <a:lstStyle/>
-                    <a:p>
-                      <a:r>
-                        <a:rPr lang="zh-CN" altLang="en-US" sz="1600" dirty="0"/>
-                        <a:t>种类列表</a:t>
-                      </a:r>
-                    </a:p>
-                  </a:txBody>
-                  <a:tcPr/>
-                </a:tc>
-                <a:tc>
-                  <a:txBody>
-                    <a:bodyPr/>
-                    <a:lstStyle/>
-                    <a:p>
-                      <a:r>
-                        <a:rPr lang="zh-CN" altLang="en-US" sz="1600" dirty="0"/>
-                        <a:t>根据种类名</a:t>
-                      </a:r>
-                      <a:r>
-                        <a:rPr lang="en-US" altLang="zh-CN" sz="1600" dirty="0"/>
-                        <a:t>N</a:t>
-                      </a:r>
-                      <a:r>
-                        <a:rPr lang="zh-CN" altLang="en-US" sz="1600" dirty="0"/>
-                        <a:t>找到对应文档</a:t>
-                      </a:r>
-                      <a:r>
-                        <a:rPr lang="en-US" altLang="zh-CN" sz="1600" dirty="0"/>
-                        <a:t>docs/entity/N.md</a:t>
-                      </a:r>
-                      <a:r>
-                        <a:rPr lang="zh-CN" altLang="en-US" sz="1600" dirty="0"/>
-                        <a:t>，进行格式解析</a:t>
-                      </a:r>
-                    </a:p>
-                  </a:txBody>
-                  <a:tcPr/>
-                </a:tc>
-                <a:tc>
-                  <a:txBody>
-                    <a:bodyPr/>
-                    <a:lstStyle/>
-                    <a:p>
-                      <a:r>
-                        <a:rPr lang="zh-CN" altLang="en-US" sz="1600" dirty="0"/>
-                        <a:t>对应文档的数据结构（测试组名称，</a:t>
-                      </a:r>
-                      <a:r>
-                        <a:rPr lang="en-US" altLang="zh-CN" sz="1600" dirty="0"/>
-                        <a:t>[</a:t>
-                      </a:r>
-                      <a:r>
-                        <a:rPr lang="zh-CN" altLang="en-US" sz="1600" dirty="0"/>
-                        <a:t>测试用例（</a:t>
-                      </a:r>
-                      <a:r>
-                        <a:rPr lang="en-US" altLang="zh-CN" sz="1600" dirty="0"/>
-                        <a:t>[</a:t>
-                      </a:r>
-                      <a:r>
-                        <a:rPr lang="zh-CN" altLang="en-US" sz="1600" dirty="0"/>
-                        <a:t>代码</a:t>
-                      </a:r>
-                      <a:r>
-                        <a:rPr lang="en-US" altLang="zh-CN" sz="1600" dirty="0"/>
-                        <a:t>]</a:t>
-                      </a:r>
-                      <a:r>
-                        <a:rPr lang="zh-CN" altLang="en-US" sz="1600" dirty="0"/>
-                        <a:t>，</a:t>
-                      </a:r>
-                      <a:r>
-                        <a:rPr lang="en-US" altLang="zh-CN" sz="1600" dirty="0"/>
-                        <a:t>Assertion</a:t>
-                      </a:r>
-                      <a:r>
-                        <a:rPr lang="zh-CN" altLang="en-US" sz="1600" dirty="0"/>
-                        <a:t>）</a:t>
-                      </a:r>
-                      <a:r>
-                        <a:rPr lang="en-US" altLang="zh-CN" sz="1600" dirty="0"/>
-                        <a:t>]</a:t>
-                      </a:r>
-                      <a:r>
-                        <a:rPr lang="zh-CN" altLang="en-US" sz="1600" dirty="0"/>
-                        <a:t>）</a:t>
-                      </a:r>
-                    </a:p>
-                  </a:txBody>
-                  <a:tcPr/>
-                </a:tc>
-                <a:extLst>
-                  <a:ext uri="{0D108BD9-81ED-4DB2-BD59-A6C34878D82A}">
-                    <a16:rowId xmlns:a16="http://schemas.microsoft.com/office/drawing/2014/main" val="1972371418"/>
-                  </a:ext>
-                </a:extLst>
-              </a:tr>
-              <a:tr h="1044787">
-                <a:tc>
-                  <a:txBody>
-                    <a:bodyPr/>
-                    <a:lstStyle/>
-                    <a:p>
-                      <a:r>
-                        <a:rPr lang="en-US" altLang="zh-CN" sz="1600" b="1" dirty="0" err="1">
-                          <a:solidFill>
-                            <a:srgbClr val="1557AE"/>
-                          </a:solidFill>
-                        </a:rPr>
-                        <a:t>enre</a:t>
-                      </a:r>
-                      <a:r>
-                        <a:rPr lang="en-US" altLang="zh-CN" sz="1600" b="1" dirty="0">
-                          <a:solidFill>
-                            <a:srgbClr val="1557AE"/>
-                          </a:solidFill>
-                        </a:rPr>
-                        <a:t>-doc-meta-parser*</a:t>
-                      </a:r>
-                      <a:endParaRPr lang="zh-CN" altLang="en-US" sz="1600" b="1" dirty="0">
-                        <a:solidFill>
-                          <a:srgbClr val="1557AE"/>
-                        </a:solidFill>
-                      </a:endParaRPr>
-                    </a:p>
-                  </a:txBody>
-                  <a:tcPr/>
-                </a:tc>
-                <a:tc>
-                  <a:txBody>
-                    <a:bodyPr/>
-                    <a:lstStyle/>
-                    <a:p>
-                      <a:r>
-                        <a:rPr lang="zh-CN" altLang="en-US" sz="1600" dirty="0"/>
-                        <a:t>文档数据结构</a:t>
-                      </a:r>
-                    </a:p>
-                  </a:txBody>
-                  <a:tcPr/>
-                </a:tc>
-                <a:tc>
-                  <a:txBody>
-                    <a:bodyPr/>
-                    <a:lstStyle/>
-                    <a:p>
-                      <a:r>
-                        <a:rPr lang="zh-CN" altLang="en-US" sz="1600" dirty="0"/>
-                        <a:t>进行格式检查，以确定</a:t>
-                      </a:r>
-                      <a:r>
-                        <a:rPr lang="en-US" altLang="zh-CN" sz="1600" dirty="0"/>
-                        <a:t>Assertion</a:t>
-                      </a:r>
-                      <a:r>
-                        <a:rPr lang="zh-CN" altLang="en-US" sz="1600" dirty="0"/>
-                        <a:t>等符合所定义的语法规范；补全缺省的值</a:t>
-                      </a:r>
-                    </a:p>
-                  </a:txBody>
-                  <a:tcPr/>
-                </a:tc>
-                <a:tc>
-                  <a:txBody>
-                    <a:bodyPr/>
-                    <a:lstStyle/>
-                    <a:p>
-                      <a:r>
-                        <a:rPr lang="zh-CN" altLang="en-US" sz="1600" dirty="0"/>
-                        <a:t>格式良好的文档数据结构</a:t>
-                      </a:r>
-                    </a:p>
-                  </a:txBody>
-                  <a:tcPr/>
-                </a:tc>
-                <a:extLst>
-                  <a:ext uri="{0D108BD9-81ED-4DB2-BD59-A6C34878D82A}">
-                    <a16:rowId xmlns:a16="http://schemas.microsoft.com/office/drawing/2014/main" val="993146130"/>
-                  </a:ext>
-                </a:extLst>
-              </a:tr>
-              <a:tr h="1044787">
-                <a:tc>
-                  <a:txBody>
-                    <a:bodyPr/>
-                    <a:lstStyle/>
-                    <a:p>
-                      <a:r>
-                        <a:rPr lang="en-US" altLang="zh-CN" sz="1600" b="1" dirty="0" err="1">
-                          <a:solidFill>
-                            <a:srgbClr val="1557AE"/>
-                          </a:solidFill>
-                        </a:rPr>
-                        <a:t>enre</a:t>
-                      </a:r>
-                      <a:r>
-                        <a:rPr lang="en-US" altLang="zh-CN" sz="1600" b="1" dirty="0">
-                          <a:solidFill>
-                            <a:srgbClr val="1557AE"/>
-                          </a:solidFill>
-                        </a:rPr>
-                        <a:t>-test-generator*</a:t>
-                      </a:r>
-                      <a:endParaRPr lang="zh-CN" altLang="en-US" sz="1600" b="1" dirty="0">
-                        <a:solidFill>
-                          <a:srgbClr val="1557AE"/>
-                        </a:solidFill>
-                      </a:endParaRPr>
-                    </a:p>
-                  </a:txBody>
-                  <a:tcPr/>
-                </a:tc>
-                <a:tc>
-                  <a:txBody>
-                    <a:bodyPr/>
-                    <a:lstStyle/>
-                    <a:p>
-                      <a:r>
-                        <a:rPr lang="zh-CN" altLang="en-US" sz="1600" dirty="0"/>
-                        <a:t>格式良好的文档数据结构</a:t>
-                      </a:r>
-                    </a:p>
-                  </a:txBody>
-                  <a:tcPr/>
-                </a:tc>
-                <a:tc>
-                  <a:txBody>
-                    <a:bodyPr/>
-                    <a:lstStyle/>
-                    <a:p>
-                      <a:r>
-                        <a:rPr lang="zh-CN" altLang="en-US" sz="1600" dirty="0"/>
-                        <a:t>根据测试组名称</a:t>
-                      </a:r>
-                      <a:r>
-                        <a:rPr lang="en-US" altLang="zh-CN" sz="1600" dirty="0"/>
-                        <a:t>G</a:t>
-                      </a:r>
-                      <a:r>
-                        <a:rPr lang="zh-CN" altLang="en-US" sz="1600" dirty="0"/>
-                        <a:t>创建</a:t>
-                      </a:r>
-                      <a:r>
-                        <a:rPr lang="en-US" altLang="zh-CN" sz="1600" dirty="0"/>
-                        <a:t>tests/cases/_G</a:t>
-                      </a:r>
-                      <a:r>
-                        <a:rPr lang="zh-CN" altLang="en-US" sz="1600" dirty="0"/>
-                        <a:t>路径；</a:t>
-                      </a:r>
-                      <a:endParaRPr lang="en-US" altLang="zh-CN" sz="1600" dirty="0"/>
-                    </a:p>
-                    <a:p>
-                      <a:r>
-                        <a:rPr lang="zh-CN" altLang="en-US" sz="1600" dirty="0"/>
-                        <a:t>对每个测试用例，根据测试用例名称</a:t>
-                      </a:r>
-                      <a:r>
-                        <a:rPr lang="en-US" altLang="zh-CN" sz="1600" dirty="0"/>
-                        <a:t>T</a:t>
-                      </a:r>
-                      <a:r>
-                        <a:rPr lang="zh-CN" altLang="en-US" sz="1600" dirty="0"/>
-                        <a:t>创建</a:t>
-                      </a:r>
-                      <a:r>
-                        <a:rPr lang="en-US" altLang="zh-CN" sz="1600" dirty="0"/>
-                        <a:t>tests/cases/_G/_T</a:t>
-                      </a:r>
-                      <a:r>
-                        <a:rPr lang="zh-CN" altLang="en-US" sz="1600" dirty="0"/>
-                        <a:t>路径，其下存放所有测试代码文件；</a:t>
-                      </a:r>
-                      <a:endParaRPr lang="en-US" altLang="zh-CN" sz="1600" dirty="0"/>
-                    </a:p>
-                    <a:p>
-                      <a:r>
-                        <a:rPr lang="zh-CN" altLang="en-US" sz="1600" dirty="0"/>
-                        <a:t>根据</a:t>
-                      </a:r>
-                      <a:r>
-                        <a:rPr lang="en-US" altLang="zh-CN" sz="1600" dirty="0"/>
-                        <a:t>Assertion</a:t>
-                      </a:r>
-                      <a:r>
-                        <a:rPr lang="zh-CN" altLang="en-US" sz="1600" dirty="0"/>
-                        <a:t>自动生成特定测试框架的测试代码</a:t>
-                      </a:r>
-                    </a:p>
-                  </a:txBody>
-                  <a:tcPr/>
-                </a:tc>
-                <a:tc>
-                  <a:txBody>
-                    <a:bodyPr/>
-                    <a:lstStyle/>
-                    <a:p>
-                      <a:r>
-                        <a:rPr lang="en-US" altLang="zh-CN" sz="1600" dirty="0"/>
-                        <a:t>cases</a:t>
-                      </a:r>
-                      <a:r>
-                        <a:rPr lang="zh-CN" altLang="en-US" sz="1600" dirty="0"/>
-                        <a:t>和</a:t>
-                      </a:r>
-                      <a:r>
-                        <a:rPr lang="en-US" altLang="zh-CN" sz="1600" dirty="0"/>
-                        <a:t>suites</a:t>
-                      </a:r>
-                      <a:r>
-                        <a:rPr lang="zh-CN" altLang="en-US" sz="1600" dirty="0"/>
-                        <a:t>（一个</a:t>
-                      </a:r>
-                      <a:r>
-                        <a:rPr lang="en-US" altLang="zh-CN" sz="1600" dirty="0"/>
-                        <a:t>suite</a:t>
-                      </a:r>
-                      <a:r>
-                        <a:rPr lang="zh-CN" altLang="en-US" sz="1600" dirty="0"/>
-                        <a:t>文件就是一组可执行测试用例）</a:t>
-                      </a:r>
-                    </a:p>
-                  </a:txBody>
-                  <a:tcPr/>
-                </a:tc>
-                <a:extLst>
-                  <a:ext uri="{0D108BD9-81ED-4DB2-BD59-A6C34878D82A}">
-                    <a16:rowId xmlns:a16="http://schemas.microsoft.com/office/drawing/2014/main" val="1560644052"/>
-                  </a:ext>
-                </a:extLst>
-              </a:tr>
-            </a:tbl>
-          </a:graphicData>
-        </a:graphic>
-      </p:graphicFrame>
-    </p:spTree>
-    <p:extLst>
-      <p:ext uri="{BB962C8B-B14F-4D97-AF65-F5344CB8AC3E}">
-        <p14:creationId xmlns:p14="http://schemas.microsoft.com/office/powerpoint/2010/main" val="1285398028"/>
-      </p:ext>
-    </p:extLst>
-  </p:cSld>
-  <p:clrMapOvr>
-    <a:masterClrMapping/>
-  </p:clrMapOvr>
-</p:sld>
-</file>
-
 <file path=ppt/slides/slide5.xml><?xml version="1.0" encoding="utf-8"?>
 <p:sld xmlns:a="http://schemas.openxmlformats.org/drawingml/2006/main" xmlns:r="http://schemas.openxmlformats.org/officeDocument/2006/relationships" xmlns:p="http://schemas.openxmlformats.org/presentationml/2006/main">
   <p:cSld>
@@ -12590,95 +12196,6 @@
       </p:sp>
       <p:pic>
         <p:nvPicPr>
-          <p:cNvPr id="25" name="Picture 24" descr="Graphical user interface, application, Teams&#10;&#10;Description automatically generated">
-            <a:extLst>
-              <a:ext uri="{FF2B5EF4-FFF2-40B4-BE49-F238E27FC236}">
-                <a16:creationId xmlns:a16="http://schemas.microsoft.com/office/drawing/2014/main" id="{127582DD-1BBA-8CE1-97C5-0AFFA9062D77}"/>
-              </a:ext>
-            </a:extLst>
-          </p:cNvPr>
-          <p:cNvPicPr>
-            <a:picLocks noChangeAspect="1"/>
-          </p:cNvPicPr>
-          <p:nvPr/>
-        </p:nvPicPr>
-        <p:blipFill rotWithShape="1">
-          <a:blip r:embed="rId6">
-            <a:extLst>
-              <a:ext uri="{28A0092B-C50C-407E-A947-70E740481C1C}">
-                <a14:useLocalDpi xmlns:a14="http://schemas.microsoft.com/office/drawing/2010/main" val="0"/>
-              </a:ext>
-            </a:extLst>
-          </a:blip>
-          <a:srcRect l="14298" t="59245" r="57900" b="36620"/>
-          <a:stretch/>
-        </p:blipFill>
-        <p:spPr>
-          <a:xfrm>
-            <a:off x="4894728" y="4498075"/>
-            <a:ext cx="2429436" cy="622595"/>
-          </a:xfrm>
-          <a:prstGeom prst="rect">
-            <a:avLst/>
-          </a:prstGeom>
-        </p:spPr>
-      </p:pic>
-      <p:sp>
-        <p:nvSpPr>
-          <p:cNvPr id="26" name="Rectangle 25">
-            <a:extLst>
-              <a:ext uri="{FF2B5EF4-FFF2-40B4-BE49-F238E27FC236}">
-                <a16:creationId xmlns:a16="http://schemas.microsoft.com/office/drawing/2014/main" id="{81D91EB7-C9C9-033F-A142-FCBF5279391A}"/>
-              </a:ext>
-            </a:extLst>
-          </p:cNvPr>
-          <p:cNvSpPr/>
-          <p:nvPr/>
-        </p:nvSpPr>
-        <p:spPr>
-          <a:xfrm>
-            <a:off x="5822319" y="4698750"/>
-            <a:ext cx="1501845" cy="221244"/>
-          </a:xfrm>
-          <a:prstGeom prst="rect">
-            <a:avLst/>
-          </a:prstGeom>
-          <a:solidFill>
-            <a:srgbClr val="FFFF00">
-              <a:alpha val="20000"/>
-            </a:srgbClr>
-          </a:solidFill>
-          <a:ln>
-            <a:noFill/>
-          </a:ln>
-        </p:spPr>
-        <p:style>
-          <a:lnRef idx="2">
-            <a:schemeClr val="accent1">
-              <a:shade val="50000"/>
-            </a:schemeClr>
-          </a:lnRef>
-          <a:fillRef idx="1">
-            <a:schemeClr val="accent1"/>
-          </a:fillRef>
-          <a:effectRef idx="0">
-            <a:schemeClr val="accent1"/>
-          </a:effectRef>
-          <a:fontRef idx="minor">
-            <a:schemeClr val="lt1"/>
-          </a:fontRef>
-        </p:style>
-        <p:txBody>
-          <a:bodyPr rtlCol="0" anchor="ctr"/>
-          <a:lstStyle/>
-          <a:p>
-            <a:pPr algn="ctr"/>
-            <a:endParaRPr lang="zh-CN" altLang="en-US"/>
-          </a:p>
-        </p:txBody>
-      </p:sp>
-      <p:pic>
-        <p:nvPicPr>
           <p:cNvPr id="27" name="Picture 26" descr="Graphical user interface, application&#10;&#10;Description automatically generated">
             <a:extLst>
               <a:ext uri="{FF2B5EF4-FFF2-40B4-BE49-F238E27FC236}">
@@ -12864,7 +12381,7 @@
           <p:nvPr/>
         </p:nvPicPr>
         <p:blipFill rotWithShape="1">
-          <a:blip r:embed="rId7">
+          <a:blip r:embed="rId6">
             <a:extLst>
               <a:ext uri="{28A0092B-C50C-407E-A947-70E740481C1C}">
                 <a14:useLocalDpi xmlns:a14="http://schemas.microsoft.com/office/drawing/2010/main" val="0"/>
@@ -13050,6 +12567,156 @@
           </a:p>
         </p:txBody>
       </p:sp>
+      <p:grpSp>
+        <p:nvGrpSpPr>
+          <p:cNvPr id="6" name="Group 5">
+            <a:extLst>
+              <a:ext uri="{FF2B5EF4-FFF2-40B4-BE49-F238E27FC236}">
+                <a16:creationId xmlns:a16="http://schemas.microsoft.com/office/drawing/2014/main" id="{2B3F204D-A3E4-8AFE-4771-B182B6CEA3D0}"/>
+              </a:ext>
+            </a:extLst>
+          </p:cNvPr>
+          <p:cNvGrpSpPr/>
+          <p:nvPr/>
+        </p:nvGrpSpPr>
+        <p:grpSpPr>
+          <a:xfrm>
+            <a:off x="4865143" y="4561433"/>
+            <a:ext cx="2488606" cy="505602"/>
+            <a:chOff x="4894728" y="5202575"/>
+            <a:chExt cx="2488606" cy="505602"/>
+          </a:xfrm>
+        </p:grpSpPr>
+        <p:pic>
+          <p:nvPicPr>
+            <p:cNvPr id="4" name="Picture 3" descr="A screenshot of a computer&#10;&#10;Description automatically generated">
+              <a:extLst>
+                <a:ext uri="{FF2B5EF4-FFF2-40B4-BE49-F238E27FC236}">
+                  <a16:creationId xmlns:a16="http://schemas.microsoft.com/office/drawing/2014/main" id="{84538002-EA29-D750-17F4-C95DE2B7AA1B}"/>
+                </a:ext>
+              </a:extLst>
+            </p:cNvPr>
+            <p:cNvPicPr>
+              <a:picLocks noChangeAspect="1"/>
+            </p:cNvPicPr>
+            <p:nvPr/>
+          </p:nvPicPr>
+          <p:blipFill rotWithShape="1">
+            <a:blip r:embed="rId7">
+              <a:extLst>
+                <a:ext uri="{28A0092B-C50C-407E-A947-70E740481C1C}">
+                  <a14:useLocalDpi xmlns:a14="http://schemas.microsoft.com/office/drawing/2010/main" val="0"/>
+                </a:ext>
+              </a:extLst>
+            </a:blip>
+            <a:srcRect l="34713" t="58653" r="52969" b="36726"/>
+            <a:stretch/>
+          </p:blipFill>
+          <p:spPr>
+            <a:xfrm>
+              <a:off x="4894728" y="5202575"/>
+              <a:ext cx="2488606" cy="505602"/>
+            </a:xfrm>
+            <a:prstGeom prst="rect">
+              <a:avLst/>
+            </a:prstGeom>
+          </p:spPr>
+        </p:pic>
+        <p:sp>
+          <p:nvSpPr>
+            <p:cNvPr id="26" name="Rectangle 25">
+              <a:extLst>
+                <a:ext uri="{FF2B5EF4-FFF2-40B4-BE49-F238E27FC236}">
+                  <a16:creationId xmlns:a16="http://schemas.microsoft.com/office/drawing/2014/main" id="{81D91EB7-C9C9-033F-A142-FCBF5279391A}"/>
+                </a:ext>
+              </a:extLst>
+            </p:cNvPr>
+            <p:cNvSpPr/>
+            <p:nvPr/>
+          </p:nvSpPr>
+          <p:spPr>
+            <a:xfrm>
+              <a:off x="5813355" y="5206081"/>
+              <a:ext cx="1480182" cy="221244"/>
+            </a:xfrm>
+            <a:prstGeom prst="rect">
+              <a:avLst/>
+            </a:prstGeom>
+            <a:solidFill>
+              <a:srgbClr val="FFFF00">
+                <a:alpha val="20000"/>
+              </a:srgbClr>
+            </a:solidFill>
+            <a:ln>
+              <a:noFill/>
+            </a:ln>
+          </p:spPr>
+          <p:style>
+            <a:lnRef idx="2">
+              <a:schemeClr val="accent1">
+                <a:shade val="50000"/>
+              </a:schemeClr>
+            </a:lnRef>
+            <a:fillRef idx="1">
+              <a:schemeClr val="accent1"/>
+            </a:fillRef>
+            <a:effectRef idx="0">
+              <a:schemeClr val="accent1"/>
+            </a:effectRef>
+            <a:fontRef idx="minor">
+              <a:schemeClr val="lt1"/>
+            </a:fontRef>
+          </p:style>
+          <p:txBody>
+            <a:bodyPr rtlCol="0" anchor="ctr"/>
+            <a:lstStyle/>
+            <a:p>
+              <a:pPr algn="ctr"/>
+              <a:endParaRPr lang="zh-CN" altLang="en-US"/>
+            </a:p>
+          </p:txBody>
+        </p:sp>
+      </p:grpSp>
+      <p:sp>
+        <p:nvSpPr>
+          <p:cNvPr id="17" name="TextBox 16">
+            <a:extLst>
+              <a:ext uri="{FF2B5EF4-FFF2-40B4-BE49-F238E27FC236}">
+                <a16:creationId xmlns:a16="http://schemas.microsoft.com/office/drawing/2014/main" id="{FB5A68C6-22A5-7E36-B2E0-0C113D151B53}"/>
+              </a:ext>
+            </a:extLst>
+          </p:cNvPr>
+          <p:cNvSpPr txBox="1"/>
+          <p:nvPr/>
+        </p:nvSpPr>
+        <p:spPr>
+          <a:xfrm>
+            <a:off x="4229012" y="5588169"/>
+            <a:ext cx="3767667" cy="507831"/>
+          </a:xfrm>
+          <a:prstGeom prst="rect">
+            <a:avLst/>
+          </a:prstGeom>
+          <a:noFill/>
+        </p:spPr>
+        <p:txBody>
+          <a:bodyPr wrap="square" rtlCol="0">
+            <a:spAutoFit/>
+          </a:bodyPr>
+          <a:lstStyle/>
+          <a:p>
+            <a:r>
+              <a:rPr lang="zh-CN" altLang="en-US" sz="900" dirty="0"/>
+              <a:t>新格式：</a:t>
+            </a:r>
+            <a:r>
+              <a:rPr lang="en-US" altLang="zh-CN" sz="900" dirty="0"/>
+              <a:t>https://github.com/xjtu-enre/ENRE-ts/blob/d09e088f40bf4abba6c403c65ad4ee25e7ab782b/packages/enre-naming/src/name.ts</a:t>
+            </a:r>
+            <a:endParaRPr lang="zh-CN" altLang="en-US" sz="900" dirty="0"/>
+          </a:p>
+        </p:txBody>
+      </p:sp>
     </p:spTree>
     <p:extLst>
       <p:ext uri="{BB962C8B-B14F-4D97-AF65-F5344CB8AC3E}">
@@ -13111,19 +12778,7 @@
             </a:r>
             <a:r>
               <a:rPr lang="zh-CN" altLang="en-US" dirty="0"/>
-              <a:t>本地部署</a:t>
-            </a:r>
-            <a:r>
-              <a:rPr lang="en-US" altLang="zh-CN" dirty="0"/>
-              <a:t>ENRE-</a:t>
-            </a:r>
-            <a:r>
-              <a:rPr lang="en-US" altLang="zh-CN" dirty="0" err="1"/>
-              <a:t>ts</a:t>
-            </a:r>
-            <a:r>
-              <a:rPr lang="zh-CN" altLang="en-US" dirty="0"/>
-              <a:t>相关组件</a:t>
+              <a:t>从模板项目开始</a:t>
             </a:r>
           </a:p>
         </p:txBody>
@@ -13181,144 +12836,26 @@
               <a:buAutoNum type="arabicPeriod"/>
             </a:pPr>
             <a:r>
-              <a:rPr lang="en-US" altLang="zh-CN" dirty="0"/>
-              <a:t>git clone </a:t>
+              <a:rPr lang="zh-CN" altLang="en-US" dirty="0"/>
+              <a:t>参考 </a:t>
             </a:r>
             <a:r>
               <a:rPr lang="en-US" altLang="zh-CN" dirty="0">
                 <a:hlinkClick r:id="rId2"/>
               </a:rPr>
-              <a:t>https://github.com/xjtu-enre/ENRE-ts.git</a:t>
-            </a:r>
-            <a:endParaRPr lang="en-US" altLang="zh-CN" dirty="0"/>
-          </a:p>
-          <a:p>
-            <a:pPr marL="457200" indent="-457200">
-              <a:buFont typeface="+mj-lt"/>
-              <a:buAutoNum type="arabicPeriod"/>
-            </a:pPr>
+              <a:t>https://github.com/xjtu-enre/ENRE-test</a:t>
+            </a:r>
             <a:r>
               <a:rPr lang="en-US" altLang="zh-CN" dirty="0"/>
-              <a:t>cd ENRE-</a:t>
-            </a:r>
-            <a:r>
-              <a:rPr lang="en-US" altLang="zh-CN" dirty="0" err="1"/>
-              <a:t>ts</a:t>
-            </a:r>
-            <a:endParaRPr lang="en-US" altLang="zh-CN" dirty="0"/>
-          </a:p>
-          <a:p>
-            <a:pPr marL="457200" indent="-457200">
-              <a:buFont typeface="+mj-lt"/>
-              <a:buAutoNum type="arabicPeriod"/>
-            </a:pPr>
-            <a:r>
-              <a:rPr lang="en-US" altLang="zh-CN" dirty="0" err="1"/>
-              <a:t>npm</a:t>
+              <a:t> </a:t>
+            </a:r>
+            <a:r>
+              <a:rPr lang="zh-CN" altLang="en-US" dirty="0"/>
+              <a:t>的 </a:t>
             </a:r>
             <a:r>
               <a:rPr lang="en-US" altLang="zh-CN" dirty="0"/>
-              <a:t> install</a:t>
-            </a:r>
-          </a:p>
-          <a:p>
-            <a:pPr marL="457200" indent="-457200">
-              <a:buFont typeface="+mj-lt"/>
-              <a:buAutoNum type="arabicPeriod"/>
-            </a:pPr>
-            <a:r>
-              <a:rPr lang="en-US" altLang="zh-CN" dirty="0" err="1"/>
-              <a:t>npm</a:t>
-            </a:r>
-            <a:r>
-              <a:rPr lang="en-US" altLang="zh-CN" dirty="0"/>
-              <a:t> run build</a:t>
-            </a:r>
-          </a:p>
-          <a:p>
-            <a:pPr marL="457200" indent="-457200">
-              <a:buFont typeface="+mj-lt"/>
-              <a:buAutoNum type="arabicPeriod"/>
-            </a:pPr>
-            <a:endParaRPr lang="en-US" altLang="zh-CN" dirty="0"/>
-          </a:p>
-        </p:txBody>
-      </p:sp>
-      <p:sp>
-        <p:nvSpPr>
-          <p:cNvPr id="4" name="TextBox 3">
-            <a:extLst>
-              <a:ext uri="{FF2B5EF4-FFF2-40B4-BE49-F238E27FC236}">
-                <a16:creationId xmlns:a16="http://schemas.microsoft.com/office/drawing/2014/main" id="{8BF67583-3718-09F0-5036-3DDB98F7A983}"/>
-              </a:ext>
-            </a:extLst>
-          </p:cNvPr>
-          <p:cNvSpPr txBox="1"/>
-          <p:nvPr/>
-        </p:nvSpPr>
-        <p:spPr>
-          <a:xfrm>
-            <a:off x="0" y="6581001"/>
-            <a:ext cx="3728906" cy="276999"/>
-          </a:xfrm>
-          <a:prstGeom prst="rect">
-            <a:avLst/>
-          </a:prstGeom>
-          <a:noFill/>
-        </p:spPr>
-        <p:txBody>
-          <a:bodyPr wrap="none" rtlCol="0">
-            <a:spAutoFit/>
-          </a:bodyPr>
-          <a:lstStyle/>
-          <a:p>
-            <a:r>
-              <a:rPr lang="zh-CN" altLang="en-US" sz="1200" dirty="0">
-                <a:solidFill>
-                  <a:schemeClr val="bg1"/>
-                </a:solidFill>
-              </a:rPr>
-              <a:t>待</a:t>
-            </a:r>
-            <a:r>
-              <a:rPr lang="en-US" altLang="zh-CN" sz="1200" dirty="0">
-                <a:solidFill>
-                  <a:schemeClr val="bg1"/>
-                </a:solidFill>
-              </a:rPr>
-              <a:t>ENRE-</a:t>
-            </a:r>
-            <a:r>
-              <a:rPr lang="en-US" altLang="zh-CN" sz="1200" dirty="0" err="1">
-                <a:solidFill>
-                  <a:schemeClr val="bg1"/>
-                </a:solidFill>
-              </a:rPr>
-              <a:t>ts</a:t>
-            </a:r>
-            <a:r>
-              <a:rPr lang="zh-CN" altLang="en-US" sz="1200" dirty="0">
-                <a:solidFill>
-                  <a:schemeClr val="bg1"/>
-                </a:solidFill>
-              </a:rPr>
-              <a:t>发布到</a:t>
-            </a:r>
-            <a:r>
-              <a:rPr lang="en-US" altLang="zh-CN" sz="1200" dirty="0" err="1">
-                <a:solidFill>
-                  <a:schemeClr val="bg1"/>
-                </a:solidFill>
-              </a:rPr>
-              <a:t>npm</a:t>
-            </a:r>
-            <a:r>
-              <a:rPr lang="zh-CN" altLang="en-US" sz="1200" dirty="0">
-                <a:solidFill>
-                  <a:schemeClr val="bg1"/>
-                </a:solidFill>
-              </a:rPr>
-              <a:t>后会变更调整简化这里的步骤</a:t>
+              <a:t>README</a:t>
             </a:r>
           </a:p>
         </p:txBody>
@@ -13358,7 +12895,7 @@
           <p:cNvPr id="2" name="Text Placeholder 1">
             <a:extLst>
               <a:ext uri="{FF2B5EF4-FFF2-40B4-BE49-F238E27FC236}">
-                <a16:creationId xmlns:a16="http://schemas.microsoft.com/office/drawing/2014/main" id="{E08BA133-52D4-32CB-AA67-C22F8C913030}"/>
+                <a16:creationId xmlns:a16="http://schemas.microsoft.com/office/drawing/2014/main" id="{A4F8FA1D-B622-51FA-A8C3-4D69DD64834A}"/>
               </a:ext>
             </a:extLst>
           </p:cNvPr>
@@ -13384,11 +12921,11 @@
             </a:r>
             <a:r>
               <a:rPr lang="zh-CN" altLang="en-US" dirty="0"/>
-              <a:t>适当调整</a:t>
+              <a:t>编写自己的 </a:t>
             </a:r>
             <a:r>
               <a:rPr lang="en-US" altLang="zh-CN" dirty="0"/>
-              <a:t>doc-meta-parser</a:t>
+              <a:t>test-generator</a:t>
             </a:r>
             <a:endParaRPr lang="zh-CN" altLang="en-US" dirty="0"/>
           </a:p>
@@ -13399,7 +12936,7 @@
           <p:cNvPr id="3" name="Content Placeholder 2">
             <a:extLst>
               <a:ext uri="{FF2B5EF4-FFF2-40B4-BE49-F238E27FC236}">
-                <a16:creationId xmlns:a16="http://schemas.microsoft.com/office/drawing/2014/main" id="{A255431B-E692-BFCF-B854-FE7846DF97E6}"/>
+                <a16:creationId xmlns:a16="http://schemas.microsoft.com/office/drawing/2014/main" id="{5C9D8ECD-9527-B2DD-822F-D07CE3A58028}"/>
               </a:ext>
             </a:extLst>
           </p:cNvPr>
@@ -13417,186 +12954,310 @@
           <a:p>
             <a:r>
               <a:rPr lang="en-US" altLang="zh-CN" dirty="0"/>
-              <a:t>packages/enre-doc-meta-parser/src/case-meta/</a:t>
+              <a:t>ENRE-xx-test/</a:t>
             </a:r>
             <a:r>
               <a:rPr lang="en-US" altLang="zh-CN" dirty="0" err="1"/>
-              <a:t>raw.ts</a:t>
+              <a:t>src</a:t>
+            </a:r>
+            <a:r>
+              <a:rPr lang="en-US" altLang="zh-CN" dirty="0"/>
+              <a:t>/index.js</a:t>
+            </a:r>
+          </a:p>
+          <a:p>
+            <a:pPr lvl="1"/>
+            <a:r>
+              <a:rPr lang="zh-CN" altLang="en-US" dirty="0"/>
+              <a:t>按照该文件中的 </a:t>
+            </a:r>
+            <a:r>
+              <a:rPr lang="en-US" altLang="zh-CN" dirty="0"/>
+              <a:t>TODO </a:t>
+            </a:r>
+            <a:r>
+              <a:rPr lang="zh-CN" altLang="en-US" dirty="0"/>
+              <a:t>注释，将输入进来的文档数据结构转换为自己语言下特定测试框架所用的代码（字符串拼接）</a:t>
             </a:r>
             <a:endParaRPr lang="en-US" altLang="zh-CN" dirty="0"/>
           </a:p>
           <a:p>
-            <a:r>
-              <a:rPr lang="zh-CN" altLang="en-US" dirty="0"/>
-              <a:t>这个文件以</a:t>
-            </a:r>
-            <a:r>
-              <a:rPr lang="en-US" altLang="zh-CN" dirty="0" err="1"/>
-              <a:t>JSONSchema</a:t>
-            </a:r>
-            <a:r>
-              <a:rPr lang="zh-CN" altLang="en-US" dirty="0"/>
-              <a:t>的格式约束了</a:t>
-            </a:r>
-            <a:r>
-              <a:rPr lang="en-US" altLang="zh-CN" dirty="0"/>
-              <a:t>Assertion Block</a:t>
-            </a:r>
-            <a:r>
-              <a:rPr lang="zh-CN" altLang="en-US" dirty="0"/>
-              <a:t>中允许出现的字段</a:t>
-            </a:r>
-            <a:endParaRPr lang="en-US" altLang="zh-CN" dirty="0"/>
-          </a:p>
-          <a:p>
-            <a:r>
-              <a:rPr lang="zh-CN" altLang="en-US" dirty="0"/>
-              <a:t>你可能要做以下调整：</a:t>
-            </a:r>
-            <a:endParaRPr lang="en-US" altLang="zh-CN" dirty="0"/>
-          </a:p>
-          <a:p>
-            <a:pPr lvl="1"/>
-            <a:r>
-              <a:rPr lang="zh-CN" altLang="en-US" dirty="0"/>
-              <a:t>将</a:t>
-            </a:r>
-            <a:r>
-              <a:rPr lang="en-US" altLang="zh-CN" dirty="0" err="1"/>
-              <a:t>schemaObj</a:t>
-            </a:r>
-            <a:r>
-              <a:rPr lang="en-US" altLang="zh-CN" dirty="0"/>
-              <a:t>/properties/entity</a:t>
-            </a:r>
-            <a:r>
-              <a:rPr lang="zh-CN" altLang="en-US" dirty="0"/>
-              <a:t>或</a:t>
-            </a:r>
-            <a:r>
-              <a:rPr lang="en-US" altLang="zh-CN" dirty="0"/>
-              <a:t>relation/properties/type/</a:t>
-            </a:r>
-            <a:r>
-              <a:rPr lang="en-US" altLang="zh-CN" dirty="0" err="1"/>
-              <a:t>enum</a:t>
-            </a:r>
-            <a:r>
-              <a:rPr lang="zh-CN" altLang="en-US" dirty="0"/>
-              <a:t>调整为自己语言的所有实体</a:t>
-            </a:r>
-            <a:r>
-              <a:rPr lang="en-US" altLang="zh-CN" dirty="0"/>
-              <a:t>/</a:t>
-            </a:r>
-            <a:r>
-              <a:rPr lang="zh-CN" altLang="en-US" dirty="0"/>
-              <a:t>依赖种类</a:t>
-            </a:r>
-            <a:endParaRPr lang="en-US" altLang="zh-CN" dirty="0"/>
-          </a:p>
-          <a:p>
-            <a:pPr lvl="1"/>
-            <a:r>
-              <a:rPr lang="zh-CN" altLang="en-US" dirty="0"/>
-              <a:t>将</a:t>
-            </a:r>
-            <a:r>
-              <a:rPr lang="en-US" altLang="zh-CN" dirty="0" err="1"/>
-              <a:t>schemaObj</a:t>
-            </a:r>
-            <a:r>
-              <a:rPr lang="en-US" altLang="zh-CN" dirty="0"/>
-              <a:t>/properties/entity</a:t>
-            </a:r>
-            <a:r>
-              <a:rPr lang="zh-CN" altLang="en-US" dirty="0"/>
-              <a:t>或</a:t>
-            </a:r>
-            <a:r>
-              <a:rPr lang="en-US" altLang="zh-CN" dirty="0"/>
-              <a:t>relation/properties/items/items/</a:t>
-            </a:r>
-            <a:r>
-              <a:rPr lang="en-US" altLang="zh-CN" dirty="0" err="1"/>
-              <a:t>oneOf</a:t>
-            </a:r>
-            <a:r>
-              <a:rPr lang="zh-CN" altLang="en-US" dirty="0"/>
-              <a:t>对应调整为该特定实体</a:t>
-            </a:r>
-            <a:r>
-              <a:rPr lang="en-US" altLang="zh-CN" dirty="0"/>
-              <a:t>/</a:t>
-            </a:r>
-            <a:r>
-              <a:rPr lang="zh-CN" altLang="en-US" dirty="0"/>
-              <a:t>依赖种类下所特有的属性</a:t>
-            </a:r>
-            <a:endParaRPr lang="en-US" altLang="zh-CN" dirty="0"/>
-          </a:p>
-          <a:p>
-            <a:pPr lvl="1"/>
+            <a:pPr marL="0" indent="0">
+              <a:buNone/>
+            </a:pPr>
             <a:endParaRPr lang="zh-CN" altLang="en-US" dirty="0"/>
           </a:p>
         </p:txBody>
       </p:sp>
-      <p:sp>
-        <p:nvSpPr>
-          <p:cNvPr id="4" name="TextBox 3">
-            <a:extLst>
-              <a:ext uri="{FF2B5EF4-FFF2-40B4-BE49-F238E27FC236}">
-                <a16:creationId xmlns:a16="http://schemas.microsoft.com/office/drawing/2014/main" id="{5393A1AE-3103-9AE4-D7AD-4350E2ED113C}"/>
-              </a:ext>
-            </a:extLst>
-          </p:cNvPr>
-          <p:cNvSpPr txBox="1"/>
+      <p:pic>
+        <p:nvPicPr>
+          <p:cNvPr id="4" name="Picture 3" descr="Graphical user interface, text, application, Teams&#10;&#10;Description automatically generated">
+            <a:extLst>
+              <a:ext uri="{FF2B5EF4-FFF2-40B4-BE49-F238E27FC236}">
+                <a16:creationId xmlns:a16="http://schemas.microsoft.com/office/drawing/2014/main" id="{FB0824A5-D12F-ED79-5990-6529184788CD}"/>
+              </a:ext>
+            </a:extLst>
+          </p:cNvPr>
+          <p:cNvPicPr>
+            <a:picLocks noChangeAspect="1"/>
+          </p:cNvPicPr>
           <p:nvPr/>
-        </p:nvSpPr>
+        </p:nvPicPr>
+        <p:blipFill rotWithShape="1">
+          <a:blip r:embed="rId2">
+            <a:extLst>
+              <a:ext uri="{28A0092B-C50C-407E-A947-70E740481C1C}">
+                <a14:useLocalDpi xmlns:a14="http://schemas.microsoft.com/office/drawing/2010/main" val="0"/>
+              </a:ext>
+            </a:extLst>
+          </a:blip>
+          <a:srcRect l="10235" t="58213" r="65406" b="30839"/>
+          <a:stretch/>
+        </p:blipFill>
         <p:spPr>
           <a:xfrm>
-            <a:off x="0" y="6581001"/>
-            <a:ext cx="8372035" cy="276999"/>
+            <a:off x="470358" y="3429000"/>
+            <a:ext cx="3590654" cy="2779859"/>
           </a:xfrm>
           <a:prstGeom prst="rect">
             <a:avLst/>
           </a:prstGeom>
-          <a:noFill/>
         </p:spPr>
-        <p:txBody>
-          <a:bodyPr wrap="none" rtlCol="0">
-            <a:spAutoFit/>
-          </a:bodyPr>
-          <a:lstStyle/>
-          <a:p>
-            <a:r>
-              <a:rPr lang="zh-CN" altLang="en-US" sz="1200" dirty="0">
-                <a:solidFill>
-                  <a:schemeClr val="bg1"/>
-                </a:solidFill>
-              </a:rPr>
-              <a:t>参考</a:t>
-            </a:r>
-            <a:r>
-              <a:rPr lang="en-US" altLang="zh-CN" sz="1200" dirty="0">
-                <a:solidFill>
-                  <a:schemeClr val="bg1"/>
-                </a:solidFill>
-              </a:rPr>
-              <a:t>https://github.com/xjtu-enre/ENRE-ts/blob/main/packages/enre-doc-meta-parser/src/case-meta/raw.ts</a:t>
-            </a:r>
-            <a:endParaRPr lang="zh-CN" altLang="en-US" sz="1200" dirty="0">
-              <a:solidFill>
-                <a:schemeClr val="bg1"/>
-              </a:solidFill>
-            </a:endParaRPr>
-          </a:p>
-        </p:txBody>
-      </p:sp>
+      </p:pic>
+      <p:pic>
+        <p:nvPicPr>
+          <p:cNvPr id="5" name="Picture 4" descr="Text&#10;&#10;Description automatically generated">
+            <a:extLst>
+              <a:ext uri="{FF2B5EF4-FFF2-40B4-BE49-F238E27FC236}">
+                <a16:creationId xmlns:a16="http://schemas.microsoft.com/office/drawing/2014/main" id="{0F7451F1-CDCD-6F51-192F-88C78C25DB34}"/>
+              </a:ext>
+            </a:extLst>
+          </p:cNvPr>
+          <p:cNvPicPr>
+            <a:picLocks noChangeAspect="1"/>
+          </p:cNvPicPr>
+          <p:nvPr/>
+        </p:nvPicPr>
+        <p:blipFill rotWithShape="1">
+          <a:blip r:embed="rId3">
+            <a:extLst>
+              <a:ext uri="{28A0092B-C50C-407E-A947-70E740481C1C}">
+                <a14:useLocalDpi xmlns:a14="http://schemas.microsoft.com/office/drawing/2010/main" val="0"/>
+              </a:ext>
+            </a:extLst>
+          </a:blip>
+          <a:srcRect l="5414" t="18979" r="32016" b="46505"/>
+          <a:stretch/>
+        </p:blipFill>
+        <p:spPr>
+          <a:xfrm>
+            <a:off x="7420666" y="2770970"/>
+            <a:ext cx="4300976" cy="4087030"/>
+          </a:xfrm>
+          <a:prstGeom prst="rect">
+            <a:avLst/>
+          </a:prstGeom>
+        </p:spPr>
+      </p:pic>
+      <p:cxnSp>
+        <p:nvCxnSpPr>
+          <p:cNvPr id="7" name="Straight Arrow Connector 6">
+            <a:extLst>
+              <a:ext uri="{FF2B5EF4-FFF2-40B4-BE49-F238E27FC236}">
+                <a16:creationId xmlns:a16="http://schemas.microsoft.com/office/drawing/2014/main" id="{53924D53-20B7-1113-9662-DEC538A7372E}"/>
+              </a:ext>
+            </a:extLst>
+          </p:cNvPr>
+          <p:cNvCxnSpPr/>
+          <p:nvPr/>
+        </p:nvCxnSpPr>
+        <p:spPr>
+          <a:xfrm>
+            <a:off x="2474259" y="4383741"/>
+            <a:ext cx="5701553" cy="1645583"/>
+          </a:xfrm>
+          <a:prstGeom prst="straightConnector1">
+            <a:avLst/>
+          </a:prstGeom>
+          <a:ln>
+            <a:tailEnd type="triangle"/>
+          </a:ln>
+        </p:spPr>
+        <p:style>
+          <a:lnRef idx="1">
+            <a:schemeClr val="accent1"/>
+          </a:lnRef>
+          <a:fillRef idx="0">
+            <a:schemeClr val="accent1"/>
+          </a:fillRef>
+          <a:effectRef idx="0">
+            <a:schemeClr val="accent1"/>
+          </a:effectRef>
+          <a:fontRef idx="minor">
+            <a:schemeClr val="tx1"/>
+          </a:fontRef>
+        </p:style>
+      </p:cxnSp>
+      <p:cxnSp>
+        <p:nvCxnSpPr>
+          <p:cNvPr id="9" name="Straight Arrow Connector 8">
+            <a:extLst>
+              <a:ext uri="{FF2B5EF4-FFF2-40B4-BE49-F238E27FC236}">
+                <a16:creationId xmlns:a16="http://schemas.microsoft.com/office/drawing/2014/main" id="{FFF72676-640D-9D7D-144F-0C162FB0D685}"/>
+              </a:ext>
+            </a:extLst>
+          </p:cNvPr>
+          <p:cNvCxnSpPr/>
+          <p:nvPr/>
+        </p:nvCxnSpPr>
+        <p:spPr>
+          <a:xfrm flipV="1">
+            <a:off x="2474259" y="3953435"/>
+            <a:ext cx="5513294" cy="735106"/>
+          </a:xfrm>
+          <a:prstGeom prst="straightConnector1">
+            <a:avLst/>
+          </a:prstGeom>
+          <a:ln>
+            <a:tailEnd type="triangle"/>
+          </a:ln>
+        </p:spPr>
+        <p:style>
+          <a:lnRef idx="1">
+            <a:schemeClr val="accent1"/>
+          </a:lnRef>
+          <a:fillRef idx="0">
+            <a:schemeClr val="accent1"/>
+          </a:fillRef>
+          <a:effectRef idx="0">
+            <a:schemeClr val="accent1"/>
+          </a:effectRef>
+          <a:fontRef idx="minor">
+            <a:schemeClr val="tx1"/>
+          </a:fontRef>
+        </p:style>
+      </p:cxnSp>
+      <p:cxnSp>
+        <p:nvCxnSpPr>
+          <p:cNvPr id="11" name="Straight Arrow Connector 10">
+            <a:extLst>
+              <a:ext uri="{FF2B5EF4-FFF2-40B4-BE49-F238E27FC236}">
+                <a16:creationId xmlns:a16="http://schemas.microsoft.com/office/drawing/2014/main" id="{5DD0BAF5-1D8B-4B21-D9FA-E6EF5B9DF856}"/>
+              </a:ext>
+            </a:extLst>
+          </p:cNvPr>
+          <p:cNvCxnSpPr/>
+          <p:nvPr/>
+        </p:nvCxnSpPr>
+        <p:spPr>
+          <a:xfrm flipV="1">
+            <a:off x="3863788" y="4285129"/>
+            <a:ext cx="4267202" cy="921403"/>
+          </a:xfrm>
+          <a:prstGeom prst="straightConnector1">
+            <a:avLst/>
+          </a:prstGeom>
+          <a:ln>
+            <a:tailEnd type="triangle"/>
+          </a:ln>
+        </p:spPr>
+        <p:style>
+          <a:lnRef idx="1">
+            <a:schemeClr val="accent1"/>
+          </a:lnRef>
+          <a:fillRef idx="0">
+            <a:schemeClr val="accent1"/>
+          </a:fillRef>
+          <a:effectRef idx="0">
+            <a:schemeClr val="accent1"/>
+          </a:effectRef>
+          <a:fontRef idx="minor">
+            <a:schemeClr val="tx1"/>
+          </a:fontRef>
+        </p:style>
+      </p:cxnSp>
+      <p:cxnSp>
+        <p:nvCxnSpPr>
+          <p:cNvPr id="13" name="Straight Arrow Connector 12">
+            <a:extLst>
+              <a:ext uri="{FF2B5EF4-FFF2-40B4-BE49-F238E27FC236}">
+                <a16:creationId xmlns:a16="http://schemas.microsoft.com/office/drawing/2014/main" id="{7ED60F11-1B36-FAEF-3087-2F579F53B2A3}"/>
+              </a:ext>
+            </a:extLst>
+          </p:cNvPr>
+          <p:cNvCxnSpPr/>
+          <p:nvPr/>
+        </p:nvCxnSpPr>
+        <p:spPr>
+          <a:xfrm flipV="1">
+            <a:off x="3607238" y="5002306"/>
+            <a:ext cx="4496856" cy="546847"/>
+          </a:xfrm>
+          <a:prstGeom prst="straightConnector1">
+            <a:avLst/>
+          </a:prstGeom>
+          <a:ln>
+            <a:tailEnd type="triangle"/>
+          </a:ln>
+        </p:spPr>
+        <p:style>
+          <a:lnRef idx="1">
+            <a:schemeClr val="accent1"/>
+          </a:lnRef>
+          <a:fillRef idx="0">
+            <a:schemeClr val="accent1"/>
+          </a:fillRef>
+          <a:effectRef idx="0">
+            <a:schemeClr val="accent1"/>
+          </a:effectRef>
+          <a:fontRef idx="minor">
+            <a:schemeClr val="tx1"/>
+          </a:fontRef>
+        </p:style>
+      </p:cxnSp>
+      <p:cxnSp>
+        <p:nvCxnSpPr>
+          <p:cNvPr id="15" name="Straight Arrow Connector 14">
+            <a:extLst>
+              <a:ext uri="{FF2B5EF4-FFF2-40B4-BE49-F238E27FC236}">
+                <a16:creationId xmlns:a16="http://schemas.microsoft.com/office/drawing/2014/main" id="{0DC5DCE3-107C-F8B6-21AF-F5EAAAD255A5}"/>
+              </a:ext>
+            </a:extLst>
+          </p:cNvPr>
+          <p:cNvCxnSpPr/>
+          <p:nvPr/>
+        </p:nvCxnSpPr>
+        <p:spPr>
+          <a:xfrm>
+            <a:off x="3675529" y="5845668"/>
+            <a:ext cx="4500283" cy="357032"/>
+          </a:xfrm>
+          <a:prstGeom prst="straightConnector1">
+            <a:avLst/>
+          </a:prstGeom>
+          <a:ln>
+            <a:tailEnd type="triangle"/>
+          </a:ln>
+        </p:spPr>
+        <p:style>
+          <a:lnRef idx="1">
+            <a:schemeClr val="accent1"/>
+          </a:lnRef>
+          <a:fillRef idx="0">
+            <a:schemeClr val="accent1"/>
+          </a:fillRef>
+          <a:effectRef idx="0">
+            <a:schemeClr val="accent1"/>
+          </a:effectRef>
+          <a:fontRef idx="minor">
+            <a:schemeClr val="tx1"/>
+          </a:fontRef>
+        </p:style>
+      </p:cxnSp>
     </p:spTree>
     <p:extLst>
       <p:ext uri="{BB962C8B-B14F-4D97-AF65-F5344CB8AC3E}">
-        <p14:creationId xmlns:p14="http://schemas.microsoft.com/office/powerpoint/2010/main" val="1763781173"/>
+        <p14:creationId xmlns:p14="http://schemas.microsoft.com/office/powerpoint/2010/main" val="976734512"/>
       </p:ext>
     </p:extLst>
   </p:cSld>

</xml_diff>